<commit_message>
updating final for tonight
</commit_message>
<xml_diff>
--- a/lectures/01 - Introduction.pptx
+++ b/lectures/01 - Introduction.pptx
@@ -5,7 +5,7 @@
     <p:sldMasterId id="2147483660" r:id="rId1"/>
   </p:sldMasterIdLst>
   <p:notesMasterIdLst>
-    <p:notesMasterId r:id="rId13"/>
+    <p:notesMasterId r:id="rId27"/>
   </p:notesMasterIdLst>
   <p:sldIdLst>
     <p:sldId id="313" r:id="rId2"/>
@@ -15,10 +15,24 @@
     <p:sldId id="258" r:id="rId6"/>
     <p:sldId id="260" r:id="rId7"/>
     <p:sldId id="319" r:id="rId8"/>
-    <p:sldId id="261" r:id="rId9"/>
-    <p:sldId id="314" r:id="rId10"/>
-    <p:sldId id="315" r:id="rId11"/>
-    <p:sldId id="316" r:id="rId12"/>
+    <p:sldId id="320" r:id="rId9"/>
+    <p:sldId id="261" r:id="rId10"/>
+    <p:sldId id="314" r:id="rId11"/>
+    <p:sldId id="315" r:id="rId12"/>
+    <p:sldId id="316" r:id="rId13"/>
+    <p:sldId id="332" r:id="rId14"/>
+    <p:sldId id="331" r:id="rId15"/>
+    <p:sldId id="321" r:id="rId16"/>
+    <p:sldId id="322" r:id="rId17"/>
+    <p:sldId id="323" r:id="rId18"/>
+    <p:sldId id="324" r:id="rId19"/>
+    <p:sldId id="325" r:id="rId20"/>
+    <p:sldId id="326" r:id="rId21"/>
+    <p:sldId id="327" r:id="rId22"/>
+    <p:sldId id="328" r:id="rId23"/>
+    <p:sldId id="329" r:id="rId24"/>
+    <p:sldId id="330" r:id="rId25"/>
+    <p:sldId id="333" r:id="rId26"/>
   </p:sldIdLst>
   <p:sldSz cx="12192000" cy="6858000"/>
   <p:notesSz cx="6858000" cy="9144000"/>
@@ -125,23 +139,31 @@
 </p:presentation>
 </file>
 
+<file path=ppt/revisionInfo.xml><?xml version="1.0" encoding="utf-8"?>
+<p1510:revInfo xmlns:a="http://schemas.openxmlformats.org/drawingml/2006/main" xmlns:r="http://schemas.openxmlformats.org/officeDocument/2006/relationships" xmlns:p1510="http://schemas.microsoft.com/office/powerpoint/2015/10/main">
+  <p1510:revLst>
+    <p1510:client id="{7EF091A2-6ACD-7C44-BF26-8B2484B06C9B}" v="28" dt="2020-01-07T23:42:42.788"/>
+  </p1510:revLst>
+</p1510:revInfo>
+</file>
+
 <file path=ppt/changesInfos/changesInfo1.xml><?xml version="1.0" encoding="utf-8"?>
 <pc:chgInfo xmlns:a="http://schemas.openxmlformats.org/drawingml/2006/main" xmlns:r="http://schemas.openxmlformats.org/officeDocument/2006/relationships" xmlns:ac="http://schemas.microsoft.com/office/drawing/2013/main/command" xmlns:pc="http://schemas.microsoft.com/office/powerpoint/2013/main/command">
   <pc:docChgLst>
     <pc:chgData name="Michaeljon Miller" userId="c575fe5cddd8b8cf" providerId="LiveId" clId="{7EF091A2-6ACD-7C44-BF26-8B2484B06C9B}"/>
-    <pc:docChg chg="custSel modSld">
-      <pc:chgData name="Michaeljon Miller" userId="c575fe5cddd8b8cf" providerId="LiveId" clId="{7EF091A2-6ACD-7C44-BF26-8B2484B06C9B}" dt="2019-12-31T17:12:31.648" v="532" actId="20577"/>
+    <pc:docChg chg="undo custSel addSld delSld modSld sldOrd">
+      <pc:chgData name="Michaeljon Miller" userId="c575fe5cddd8b8cf" providerId="LiveId" clId="{7EF091A2-6ACD-7C44-BF26-8B2484B06C9B}" dt="2020-01-07T23:43:53.562" v="1812" actId="20577"/>
       <pc:docMkLst>
         <pc:docMk/>
       </pc:docMkLst>
       <pc:sldChg chg="modSp">
-        <pc:chgData name="Michaeljon Miller" userId="c575fe5cddd8b8cf" providerId="LiveId" clId="{7EF091A2-6ACD-7C44-BF26-8B2484B06C9B}" dt="2019-12-31T17:00:36.316" v="329" actId="20577"/>
+        <pc:chgData name="Michaeljon Miller" userId="c575fe5cddd8b8cf" providerId="LiveId" clId="{7EF091A2-6ACD-7C44-BF26-8B2484B06C9B}" dt="2020-01-07T22:58:35.419" v="536" actId="20577"/>
         <pc:sldMkLst>
           <pc:docMk/>
           <pc:sldMk cId="281628526" sldId="257"/>
         </pc:sldMkLst>
         <pc:spChg chg="mod">
-          <ac:chgData name="Michaeljon Miller" userId="c575fe5cddd8b8cf" providerId="LiveId" clId="{7EF091A2-6ACD-7C44-BF26-8B2484B06C9B}" dt="2019-12-31T17:00:36.316" v="329" actId="20577"/>
+          <ac:chgData name="Michaeljon Miller" userId="c575fe5cddd8b8cf" providerId="LiveId" clId="{7EF091A2-6ACD-7C44-BF26-8B2484B06C9B}" dt="2020-01-07T22:58:35.419" v="536" actId="20577"/>
           <ac:spMkLst>
             <pc:docMk/>
             <pc:sldMk cId="281628526" sldId="257"/>
@@ -165,19 +187,26 @@
         </pc:spChg>
       </pc:sldChg>
       <pc:sldChg chg="modSp">
-        <pc:chgData name="Michaeljon Miller" userId="c575fe5cddd8b8cf" providerId="LiveId" clId="{7EF091A2-6ACD-7C44-BF26-8B2484B06C9B}" dt="2019-12-31T17:12:31.648" v="532" actId="20577"/>
+        <pc:chgData name="Michaeljon Miller" userId="c575fe5cddd8b8cf" providerId="LiveId" clId="{7EF091A2-6ACD-7C44-BF26-8B2484B06C9B}" dt="2020-01-07T23:01:25.442" v="651" actId="20577"/>
         <pc:sldMkLst>
           <pc:docMk/>
           <pc:sldMk cId="3703959879" sldId="260"/>
         </pc:sldMkLst>
         <pc:spChg chg="mod">
-          <ac:chgData name="Michaeljon Miller" userId="c575fe5cddd8b8cf" providerId="LiveId" clId="{7EF091A2-6ACD-7C44-BF26-8B2484B06C9B}" dt="2019-12-31T17:12:31.648" v="532" actId="20577"/>
+          <ac:chgData name="Michaeljon Miller" userId="c575fe5cddd8b8cf" providerId="LiveId" clId="{7EF091A2-6ACD-7C44-BF26-8B2484B06C9B}" dt="2020-01-07T23:01:25.442" v="651" actId="20577"/>
           <ac:spMkLst>
             <pc:docMk/>
             <pc:sldMk cId="3703959879" sldId="260"/>
             <ac:spMk id="3" creationId="{00000000-0000-0000-0000-000000000000}"/>
           </ac:spMkLst>
         </pc:spChg>
+      </pc:sldChg>
+      <pc:sldChg chg="ord">
+        <pc:chgData name="Michaeljon Miller" userId="c575fe5cddd8b8cf" providerId="LiveId" clId="{7EF091A2-6ACD-7C44-BF26-8B2484B06C9B}" dt="2020-01-07T23:23:08.840" v="1302"/>
+        <pc:sldMkLst>
+          <pc:docMk/>
+          <pc:sldMk cId="1438224000" sldId="316"/>
+        </pc:sldMkLst>
       </pc:sldChg>
       <pc:sldChg chg="modSp">
         <pc:chgData name="Michaeljon Miller" userId="c575fe5cddd8b8cf" providerId="LiveId" clId="{7EF091A2-6ACD-7C44-BF26-8B2484B06C9B}" dt="2019-12-31T17:01:48.107" v="437" actId="20577"/>
@@ -199,6 +228,558 @@
             <pc:docMk/>
             <pc:sldMk cId="639142658" sldId="318"/>
             <ac:spMk id="4" creationId="{AFAEFCB6-2794-724A-8566-92A7F00B63CB}"/>
+          </ac:spMkLst>
+        </pc:spChg>
+      </pc:sldChg>
+      <pc:sldChg chg="modSp">
+        <pc:chgData name="Michaeljon Miller" userId="c575fe5cddd8b8cf" providerId="LiveId" clId="{7EF091A2-6ACD-7C44-BF26-8B2484B06C9B}" dt="2020-01-07T23:03:37.101" v="662" actId="20577"/>
+        <pc:sldMkLst>
+          <pc:docMk/>
+          <pc:sldMk cId="368945512" sldId="319"/>
+        </pc:sldMkLst>
+        <pc:spChg chg="mod">
+          <ac:chgData name="Michaeljon Miller" userId="c575fe5cddd8b8cf" providerId="LiveId" clId="{7EF091A2-6ACD-7C44-BF26-8B2484B06C9B}" dt="2020-01-07T23:03:37.101" v="662" actId="20577"/>
+          <ac:spMkLst>
+            <pc:docMk/>
+            <pc:sldMk cId="368945512" sldId="319"/>
+            <ac:spMk id="5" creationId="{39C2DD69-AA45-104D-9712-E044843BB730}"/>
+          </ac:spMkLst>
+        </pc:spChg>
+      </pc:sldChg>
+      <pc:sldChg chg="addSp delSp modSp new mod modClrScheme chgLayout">
+        <pc:chgData name="Michaeljon Miller" userId="c575fe5cddd8b8cf" providerId="LiveId" clId="{7EF091A2-6ACD-7C44-BF26-8B2484B06C9B}" dt="2020-01-07T23:04:22.384" v="685" actId="20577"/>
+        <pc:sldMkLst>
+          <pc:docMk/>
+          <pc:sldMk cId="1943180212" sldId="320"/>
+        </pc:sldMkLst>
+        <pc:spChg chg="del mod ord">
+          <ac:chgData name="Michaeljon Miller" userId="c575fe5cddd8b8cf" providerId="LiveId" clId="{7EF091A2-6ACD-7C44-BF26-8B2484B06C9B}" dt="2020-01-07T23:04:18.328" v="664" actId="700"/>
+          <ac:spMkLst>
+            <pc:docMk/>
+            <pc:sldMk cId="1943180212" sldId="320"/>
+            <ac:spMk id="2" creationId="{61226C0C-A9CD-4E48-BF83-FE8CF8729AA0}"/>
+          </ac:spMkLst>
+        </pc:spChg>
+        <pc:spChg chg="del mod ord">
+          <ac:chgData name="Michaeljon Miller" userId="c575fe5cddd8b8cf" providerId="LiveId" clId="{7EF091A2-6ACD-7C44-BF26-8B2484B06C9B}" dt="2020-01-07T23:04:18.328" v="664" actId="700"/>
+          <ac:spMkLst>
+            <pc:docMk/>
+            <pc:sldMk cId="1943180212" sldId="320"/>
+            <ac:spMk id="3" creationId="{42ED4FB7-4D36-6F42-866A-98613165BAF9}"/>
+          </ac:spMkLst>
+        </pc:spChg>
+        <pc:spChg chg="del">
+          <ac:chgData name="Michaeljon Miller" userId="c575fe5cddd8b8cf" providerId="LiveId" clId="{7EF091A2-6ACD-7C44-BF26-8B2484B06C9B}" dt="2020-01-07T23:04:18.328" v="664" actId="700"/>
+          <ac:spMkLst>
+            <pc:docMk/>
+            <pc:sldMk cId="1943180212" sldId="320"/>
+            <ac:spMk id="4" creationId="{4F36E813-8CD7-6642-8823-BB7FFBD69B39}"/>
+          </ac:spMkLst>
+        </pc:spChg>
+        <pc:spChg chg="add mod ord">
+          <ac:chgData name="Michaeljon Miller" userId="c575fe5cddd8b8cf" providerId="LiveId" clId="{7EF091A2-6ACD-7C44-BF26-8B2484B06C9B}" dt="2020-01-07T23:04:22.384" v="685" actId="20577"/>
+          <ac:spMkLst>
+            <pc:docMk/>
+            <pc:sldMk cId="1943180212" sldId="320"/>
+            <ac:spMk id="5" creationId="{21F03E92-7A0E-5A4F-97EA-E2518802C75F}"/>
+          </ac:spMkLst>
+        </pc:spChg>
+        <pc:spChg chg="add mod ord">
+          <ac:chgData name="Michaeljon Miller" userId="c575fe5cddd8b8cf" providerId="LiveId" clId="{7EF091A2-6ACD-7C44-BF26-8B2484B06C9B}" dt="2020-01-07T23:04:18.328" v="664" actId="700"/>
+          <ac:spMkLst>
+            <pc:docMk/>
+            <pc:sldMk cId="1943180212" sldId="320"/>
+            <ac:spMk id="6" creationId="{2C328671-7808-C646-BBDD-48F9C576AB34}"/>
+          </ac:spMkLst>
+        </pc:spChg>
+      </pc:sldChg>
+      <pc:sldChg chg="addSp delSp modSp new">
+        <pc:chgData name="Michaeljon Miller" userId="c575fe5cddd8b8cf" providerId="LiveId" clId="{7EF091A2-6ACD-7C44-BF26-8B2484B06C9B}" dt="2020-01-07T23:43:26.061" v="1792" actId="20577"/>
+        <pc:sldMkLst>
+          <pc:docMk/>
+          <pc:sldMk cId="3275625684" sldId="321"/>
+        </pc:sldMkLst>
+        <pc:spChg chg="mod">
+          <ac:chgData name="Michaeljon Miller" userId="c575fe5cddd8b8cf" providerId="LiveId" clId="{7EF091A2-6ACD-7C44-BF26-8B2484B06C9B}" dt="2020-01-07T23:43:26.061" v="1792" actId="20577"/>
+          <ac:spMkLst>
+            <pc:docMk/>
+            <pc:sldMk cId="3275625684" sldId="321"/>
+            <ac:spMk id="2" creationId="{C9898BED-61FF-EB45-BDDA-9D4ECF0DBE7D}"/>
+          </ac:spMkLst>
+        </pc:spChg>
+        <pc:spChg chg="del">
+          <ac:chgData name="Michaeljon Miller" userId="c575fe5cddd8b8cf" providerId="LiveId" clId="{7EF091A2-6ACD-7C44-BF26-8B2484B06C9B}" dt="2020-01-07T23:07:24.386" v="687"/>
+          <ac:spMkLst>
+            <pc:docMk/>
+            <pc:sldMk cId="3275625684" sldId="321"/>
+            <ac:spMk id="3" creationId="{2432F796-1203-B34D-B5B7-0805604FEC10}"/>
+          </ac:spMkLst>
+        </pc:spChg>
+        <pc:picChg chg="add mod">
+          <ac:chgData name="Michaeljon Miller" userId="c575fe5cddd8b8cf" providerId="LiveId" clId="{7EF091A2-6ACD-7C44-BF26-8B2484B06C9B}" dt="2020-01-07T23:07:24.386" v="687"/>
+          <ac:picMkLst>
+            <pc:docMk/>
+            <pc:sldMk cId="3275625684" sldId="321"/>
+            <ac:picMk id="5" creationId="{0E15E5C5-A196-C54B-8022-71C78C04FDCE}"/>
+          </ac:picMkLst>
+        </pc:picChg>
+      </pc:sldChg>
+      <pc:sldChg chg="addSp delSp modSp new mod modClrScheme chgLayout">
+        <pc:chgData name="Michaeljon Miller" userId="c575fe5cddd8b8cf" providerId="LiveId" clId="{7EF091A2-6ACD-7C44-BF26-8B2484B06C9B}" dt="2020-01-07T23:43:35.333" v="1806" actId="20577"/>
+        <pc:sldMkLst>
+          <pc:docMk/>
+          <pc:sldMk cId="1221676019" sldId="322"/>
+        </pc:sldMkLst>
+        <pc:spChg chg="del mod ord">
+          <ac:chgData name="Michaeljon Miller" userId="c575fe5cddd8b8cf" providerId="LiveId" clId="{7EF091A2-6ACD-7C44-BF26-8B2484B06C9B}" dt="2020-01-07T23:17:43.311" v="839" actId="700"/>
+          <ac:spMkLst>
+            <pc:docMk/>
+            <pc:sldMk cId="1221676019" sldId="322"/>
+            <ac:spMk id="2" creationId="{6693DA50-7222-904F-BBC3-FEF1593F62D8}"/>
+          </ac:spMkLst>
+        </pc:spChg>
+        <pc:spChg chg="del">
+          <ac:chgData name="Michaeljon Miller" userId="c575fe5cddd8b8cf" providerId="LiveId" clId="{7EF091A2-6ACD-7C44-BF26-8B2484B06C9B}" dt="2020-01-07T23:07:54.037" v="689"/>
+          <ac:spMkLst>
+            <pc:docMk/>
+            <pc:sldMk cId="1221676019" sldId="322"/>
+            <ac:spMk id="3" creationId="{F532BB55-5616-FE4A-BED5-254D377C6680}"/>
+          </ac:spMkLst>
+        </pc:spChg>
+        <pc:spChg chg="add mod ord">
+          <ac:chgData name="Michaeljon Miller" userId="c575fe5cddd8b8cf" providerId="LiveId" clId="{7EF091A2-6ACD-7C44-BF26-8B2484B06C9B}" dt="2020-01-07T23:43:35.333" v="1806" actId="20577"/>
+          <ac:spMkLst>
+            <pc:docMk/>
+            <pc:sldMk cId="1221676019" sldId="322"/>
+            <ac:spMk id="6" creationId="{16AFF953-46B1-5044-9DCE-DDBD73CDC2A8}"/>
+          </ac:spMkLst>
+        </pc:spChg>
+        <pc:spChg chg="add del mod ord">
+          <ac:chgData name="Michaeljon Miller" userId="c575fe5cddd8b8cf" providerId="LiveId" clId="{7EF091A2-6ACD-7C44-BF26-8B2484B06C9B}" dt="2020-01-07T23:22:13.234" v="1301" actId="700"/>
+          <ac:spMkLst>
+            <pc:docMk/>
+            <pc:sldMk cId="1221676019" sldId="322"/>
+            <ac:spMk id="7" creationId="{AF791F18-AE5C-9645-B0E7-B238EC4277EB}"/>
+          </ac:spMkLst>
+        </pc:spChg>
+        <pc:picChg chg="add mod ord">
+          <ac:chgData name="Michaeljon Miller" userId="c575fe5cddd8b8cf" providerId="LiveId" clId="{7EF091A2-6ACD-7C44-BF26-8B2484B06C9B}" dt="2020-01-07T23:22:13.234" v="1301" actId="700"/>
+          <ac:picMkLst>
+            <pc:docMk/>
+            <pc:sldMk cId="1221676019" sldId="322"/>
+            <ac:picMk id="5" creationId="{19539023-B6F1-F641-9858-61A9AA5C8E5E}"/>
+          </ac:picMkLst>
+        </pc:picChg>
+      </pc:sldChg>
+      <pc:sldChg chg="addSp delSp modSp new">
+        <pc:chgData name="Michaeljon Miller" userId="c575fe5cddd8b8cf" providerId="LiveId" clId="{7EF091A2-6ACD-7C44-BF26-8B2484B06C9B}" dt="2020-01-07T23:43:43.080" v="1811" actId="313"/>
+        <pc:sldMkLst>
+          <pc:docMk/>
+          <pc:sldMk cId="1216411407" sldId="323"/>
+        </pc:sldMkLst>
+        <pc:spChg chg="mod">
+          <ac:chgData name="Michaeljon Miller" userId="c575fe5cddd8b8cf" providerId="LiveId" clId="{7EF091A2-6ACD-7C44-BF26-8B2484B06C9B}" dt="2020-01-07T23:43:43.080" v="1811" actId="313"/>
+          <ac:spMkLst>
+            <pc:docMk/>
+            <pc:sldMk cId="1216411407" sldId="323"/>
+            <ac:spMk id="2" creationId="{BD4B0C05-7F30-E643-BEF5-831E921B7E99}"/>
+          </ac:spMkLst>
+        </pc:spChg>
+        <pc:spChg chg="del">
+          <ac:chgData name="Michaeljon Miller" userId="c575fe5cddd8b8cf" providerId="LiveId" clId="{7EF091A2-6ACD-7C44-BF26-8B2484B06C9B}" dt="2020-01-07T23:08:35.517" v="691"/>
+          <ac:spMkLst>
+            <pc:docMk/>
+            <pc:sldMk cId="1216411407" sldId="323"/>
+            <ac:spMk id="3" creationId="{C1E7A1A4-F75C-B94D-A9C3-87511D6F1E34}"/>
+          </ac:spMkLst>
+        </pc:spChg>
+        <pc:picChg chg="add mod">
+          <ac:chgData name="Michaeljon Miller" userId="c575fe5cddd8b8cf" providerId="LiveId" clId="{7EF091A2-6ACD-7C44-BF26-8B2484B06C9B}" dt="2020-01-07T23:08:35.517" v="691"/>
+          <ac:picMkLst>
+            <pc:docMk/>
+            <pc:sldMk cId="1216411407" sldId="323"/>
+            <ac:picMk id="5" creationId="{FA033BB2-2E93-FE40-9FC9-DAC9E8116984}"/>
+          </ac:picMkLst>
+        </pc:picChg>
+      </pc:sldChg>
+      <pc:sldChg chg="addSp delSp modSp new">
+        <pc:chgData name="Michaeljon Miller" userId="c575fe5cddd8b8cf" providerId="LiveId" clId="{7EF091A2-6ACD-7C44-BF26-8B2484B06C9B}" dt="2020-01-07T23:18:29.864" v="933" actId="20577"/>
+        <pc:sldMkLst>
+          <pc:docMk/>
+          <pc:sldMk cId="76428056" sldId="324"/>
+        </pc:sldMkLst>
+        <pc:spChg chg="mod">
+          <ac:chgData name="Michaeljon Miller" userId="c575fe5cddd8b8cf" providerId="LiveId" clId="{7EF091A2-6ACD-7C44-BF26-8B2484B06C9B}" dt="2020-01-07T23:18:29.864" v="933" actId="20577"/>
+          <ac:spMkLst>
+            <pc:docMk/>
+            <pc:sldMk cId="76428056" sldId="324"/>
+            <ac:spMk id="2" creationId="{C1CB1F6E-9CFD-0948-9545-1B29E2E6499B}"/>
+          </ac:spMkLst>
+        </pc:spChg>
+        <pc:spChg chg="del">
+          <ac:chgData name="Michaeljon Miller" userId="c575fe5cddd8b8cf" providerId="LiveId" clId="{7EF091A2-6ACD-7C44-BF26-8B2484B06C9B}" dt="2020-01-07T23:08:52.769" v="693"/>
+          <ac:spMkLst>
+            <pc:docMk/>
+            <pc:sldMk cId="76428056" sldId="324"/>
+            <ac:spMk id="3" creationId="{264B5AFF-A3A8-DE4F-A39D-C21F47C7E5B7}"/>
+          </ac:spMkLst>
+        </pc:spChg>
+        <pc:picChg chg="add mod">
+          <ac:chgData name="Michaeljon Miller" userId="c575fe5cddd8b8cf" providerId="LiveId" clId="{7EF091A2-6ACD-7C44-BF26-8B2484B06C9B}" dt="2020-01-07T23:08:52.769" v="693"/>
+          <ac:picMkLst>
+            <pc:docMk/>
+            <pc:sldMk cId="76428056" sldId="324"/>
+            <ac:picMk id="5" creationId="{29FB4F80-E9D4-9740-8200-5A3FB69159A2}"/>
+          </ac:picMkLst>
+        </pc:picChg>
+      </pc:sldChg>
+      <pc:sldChg chg="addSp delSp modSp new">
+        <pc:chgData name="Michaeljon Miller" userId="c575fe5cddd8b8cf" providerId="LiveId" clId="{7EF091A2-6ACD-7C44-BF26-8B2484B06C9B}" dt="2020-01-07T23:43:53.562" v="1812" actId="20577"/>
+        <pc:sldMkLst>
+          <pc:docMk/>
+          <pc:sldMk cId="2150556075" sldId="325"/>
+        </pc:sldMkLst>
+        <pc:spChg chg="mod">
+          <ac:chgData name="Michaeljon Miller" userId="c575fe5cddd8b8cf" providerId="LiveId" clId="{7EF091A2-6ACD-7C44-BF26-8B2484B06C9B}" dt="2020-01-07T23:43:53.562" v="1812" actId="20577"/>
+          <ac:spMkLst>
+            <pc:docMk/>
+            <pc:sldMk cId="2150556075" sldId="325"/>
+            <ac:spMk id="2" creationId="{3CA454A4-FE43-0042-B8B4-BD2635022CFF}"/>
+          </ac:spMkLst>
+        </pc:spChg>
+        <pc:spChg chg="del">
+          <ac:chgData name="Michaeljon Miller" userId="c575fe5cddd8b8cf" providerId="LiveId" clId="{7EF091A2-6ACD-7C44-BF26-8B2484B06C9B}" dt="2020-01-07T23:09:00.718" v="695"/>
+          <ac:spMkLst>
+            <pc:docMk/>
+            <pc:sldMk cId="2150556075" sldId="325"/>
+            <ac:spMk id="3" creationId="{50BDD133-6F41-9C45-BB8D-378DE1F17D2B}"/>
+          </ac:spMkLst>
+        </pc:spChg>
+        <pc:picChg chg="add mod">
+          <ac:chgData name="Michaeljon Miller" userId="c575fe5cddd8b8cf" providerId="LiveId" clId="{7EF091A2-6ACD-7C44-BF26-8B2484B06C9B}" dt="2020-01-07T23:09:00.718" v="695"/>
+          <ac:picMkLst>
+            <pc:docMk/>
+            <pc:sldMk cId="2150556075" sldId="325"/>
+            <ac:picMk id="5" creationId="{AC9BCC23-BC2F-C440-9F66-21C48725E7EC}"/>
+          </ac:picMkLst>
+        </pc:picChg>
+      </pc:sldChg>
+      <pc:sldChg chg="addSp delSp modSp new">
+        <pc:chgData name="Michaeljon Miller" userId="c575fe5cddd8b8cf" providerId="LiveId" clId="{7EF091A2-6ACD-7C44-BF26-8B2484B06C9B}" dt="2020-01-07T23:19:36.553" v="1073" actId="20577"/>
+        <pc:sldMkLst>
+          <pc:docMk/>
+          <pc:sldMk cId="3846380962" sldId="326"/>
+        </pc:sldMkLst>
+        <pc:spChg chg="mod">
+          <ac:chgData name="Michaeljon Miller" userId="c575fe5cddd8b8cf" providerId="LiveId" clId="{7EF091A2-6ACD-7C44-BF26-8B2484B06C9B}" dt="2020-01-07T23:19:36.553" v="1073" actId="20577"/>
+          <ac:spMkLst>
+            <pc:docMk/>
+            <pc:sldMk cId="3846380962" sldId="326"/>
+            <ac:spMk id="2" creationId="{F81C0E6F-DC8F-A943-A70F-41A57D1F2858}"/>
+          </ac:spMkLst>
+        </pc:spChg>
+        <pc:spChg chg="del">
+          <ac:chgData name="Michaeljon Miller" userId="c575fe5cddd8b8cf" providerId="LiveId" clId="{7EF091A2-6ACD-7C44-BF26-8B2484B06C9B}" dt="2020-01-07T23:09:44.138" v="697"/>
+          <ac:spMkLst>
+            <pc:docMk/>
+            <pc:sldMk cId="3846380962" sldId="326"/>
+            <ac:spMk id="3" creationId="{C7422D2D-C1FA-A940-9074-30AB8BE1C9FF}"/>
+          </ac:spMkLst>
+        </pc:spChg>
+        <pc:picChg chg="add mod">
+          <ac:chgData name="Michaeljon Miller" userId="c575fe5cddd8b8cf" providerId="LiveId" clId="{7EF091A2-6ACD-7C44-BF26-8B2484B06C9B}" dt="2020-01-07T23:09:44.138" v="697"/>
+          <ac:picMkLst>
+            <pc:docMk/>
+            <pc:sldMk cId="3846380962" sldId="326"/>
+            <ac:picMk id="5" creationId="{E42327E6-006F-4843-BCD9-18122C1AF169}"/>
+          </ac:picMkLst>
+        </pc:picChg>
+      </pc:sldChg>
+      <pc:sldChg chg="addSp delSp modSp new">
+        <pc:chgData name="Michaeljon Miller" userId="c575fe5cddd8b8cf" providerId="LiveId" clId="{7EF091A2-6ACD-7C44-BF26-8B2484B06C9B}" dt="2020-01-07T23:20:05.598" v="1130" actId="20577"/>
+        <pc:sldMkLst>
+          <pc:docMk/>
+          <pc:sldMk cId="3210593899" sldId="327"/>
+        </pc:sldMkLst>
+        <pc:spChg chg="mod">
+          <ac:chgData name="Michaeljon Miller" userId="c575fe5cddd8b8cf" providerId="LiveId" clId="{7EF091A2-6ACD-7C44-BF26-8B2484B06C9B}" dt="2020-01-07T23:20:05.598" v="1130" actId="20577"/>
+          <ac:spMkLst>
+            <pc:docMk/>
+            <pc:sldMk cId="3210593899" sldId="327"/>
+            <ac:spMk id="2" creationId="{A7131C5B-CE43-7041-B6CA-E00CF6DFC311}"/>
+          </ac:spMkLst>
+        </pc:spChg>
+        <pc:spChg chg="del">
+          <ac:chgData name="Michaeljon Miller" userId="c575fe5cddd8b8cf" providerId="LiveId" clId="{7EF091A2-6ACD-7C44-BF26-8B2484B06C9B}" dt="2020-01-07T23:11:20.084" v="699"/>
+          <ac:spMkLst>
+            <pc:docMk/>
+            <pc:sldMk cId="3210593899" sldId="327"/>
+            <ac:spMk id="3" creationId="{6B88B824-EECA-7E4C-AFF2-1689EA8276F0}"/>
+          </ac:spMkLst>
+        </pc:spChg>
+        <pc:picChg chg="add mod">
+          <ac:chgData name="Michaeljon Miller" userId="c575fe5cddd8b8cf" providerId="LiveId" clId="{7EF091A2-6ACD-7C44-BF26-8B2484B06C9B}" dt="2020-01-07T23:11:20.084" v="699"/>
+          <ac:picMkLst>
+            <pc:docMk/>
+            <pc:sldMk cId="3210593899" sldId="327"/>
+            <ac:picMk id="4" creationId="{94D78AA8-A78A-4B4F-9EB4-FD43D1A1FB30}"/>
+          </ac:picMkLst>
+        </pc:picChg>
+      </pc:sldChg>
+      <pc:sldChg chg="addSp delSp modSp new">
+        <pc:chgData name="Michaeljon Miller" userId="c575fe5cddd8b8cf" providerId="LiveId" clId="{7EF091A2-6ACD-7C44-BF26-8B2484B06C9B}" dt="2020-01-07T23:20:35.571" v="1180" actId="20577"/>
+        <pc:sldMkLst>
+          <pc:docMk/>
+          <pc:sldMk cId="2589144616" sldId="328"/>
+        </pc:sldMkLst>
+        <pc:spChg chg="mod">
+          <ac:chgData name="Michaeljon Miller" userId="c575fe5cddd8b8cf" providerId="LiveId" clId="{7EF091A2-6ACD-7C44-BF26-8B2484B06C9B}" dt="2020-01-07T23:20:35.571" v="1180" actId="20577"/>
+          <ac:spMkLst>
+            <pc:docMk/>
+            <pc:sldMk cId="2589144616" sldId="328"/>
+            <ac:spMk id="2" creationId="{E769078A-8FFF-0B44-BF79-A550E62177D4}"/>
+          </ac:spMkLst>
+        </pc:spChg>
+        <pc:spChg chg="del">
+          <ac:chgData name="Michaeljon Miller" userId="c575fe5cddd8b8cf" providerId="LiveId" clId="{7EF091A2-6ACD-7C44-BF26-8B2484B06C9B}" dt="2020-01-07T23:13:55.567" v="703"/>
+          <ac:spMkLst>
+            <pc:docMk/>
+            <pc:sldMk cId="2589144616" sldId="328"/>
+            <ac:spMk id="3" creationId="{258D3343-DA0E-B046-A784-A4CB4B151370}"/>
+          </ac:spMkLst>
+        </pc:spChg>
+        <pc:picChg chg="add del">
+          <ac:chgData name="Michaeljon Miller" userId="c575fe5cddd8b8cf" providerId="LiveId" clId="{7EF091A2-6ACD-7C44-BF26-8B2484B06C9B}" dt="2020-01-07T23:13:54.386" v="702"/>
+          <ac:picMkLst>
+            <pc:docMk/>
+            <pc:sldMk cId="2589144616" sldId="328"/>
+            <ac:picMk id="4" creationId="{05FF4E2A-59D3-D440-B6BC-04F19291D445}"/>
+          </ac:picMkLst>
+        </pc:picChg>
+        <pc:picChg chg="add mod">
+          <ac:chgData name="Michaeljon Miller" userId="c575fe5cddd8b8cf" providerId="LiveId" clId="{7EF091A2-6ACD-7C44-BF26-8B2484B06C9B}" dt="2020-01-07T23:13:55.567" v="703"/>
+          <ac:picMkLst>
+            <pc:docMk/>
+            <pc:sldMk cId="2589144616" sldId="328"/>
+            <ac:picMk id="5" creationId="{E4780A1B-073C-084C-8F69-3292D5E1D94D}"/>
+          </ac:picMkLst>
+        </pc:picChg>
+      </pc:sldChg>
+      <pc:sldChg chg="addSp delSp modSp new">
+        <pc:chgData name="Michaeljon Miller" userId="c575fe5cddd8b8cf" providerId="LiveId" clId="{7EF091A2-6ACD-7C44-BF26-8B2484B06C9B}" dt="2020-01-07T23:21:01.355" v="1218" actId="20577"/>
+        <pc:sldMkLst>
+          <pc:docMk/>
+          <pc:sldMk cId="2165793277" sldId="329"/>
+        </pc:sldMkLst>
+        <pc:spChg chg="mod">
+          <ac:chgData name="Michaeljon Miller" userId="c575fe5cddd8b8cf" providerId="LiveId" clId="{7EF091A2-6ACD-7C44-BF26-8B2484B06C9B}" dt="2020-01-07T23:21:01.355" v="1218" actId="20577"/>
+          <ac:spMkLst>
+            <pc:docMk/>
+            <pc:sldMk cId="2165793277" sldId="329"/>
+            <ac:spMk id="2" creationId="{206389D4-E7F9-954F-9311-3FAB881A6858}"/>
+          </ac:spMkLst>
+        </pc:spChg>
+        <pc:spChg chg="del">
+          <ac:chgData name="Michaeljon Miller" userId="c575fe5cddd8b8cf" providerId="LiveId" clId="{7EF091A2-6ACD-7C44-BF26-8B2484B06C9B}" dt="2020-01-07T23:15:56.433" v="705"/>
+          <ac:spMkLst>
+            <pc:docMk/>
+            <pc:sldMk cId="2165793277" sldId="329"/>
+            <ac:spMk id="3" creationId="{0A89C2E1-C938-D14F-A179-CBBA52AA8F6F}"/>
+          </ac:spMkLst>
+        </pc:spChg>
+        <pc:picChg chg="add mod">
+          <ac:chgData name="Michaeljon Miller" userId="c575fe5cddd8b8cf" providerId="LiveId" clId="{7EF091A2-6ACD-7C44-BF26-8B2484B06C9B}" dt="2020-01-07T23:15:56.433" v="705"/>
+          <ac:picMkLst>
+            <pc:docMk/>
+            <pc:sldMk cId="2165793277" sldId="329"/>
+            <ac:picMk id="4" creationId="{36857528-BD1A-7940-9B57-283010650AE2}"/>
+          </ac:picMkLst>
+        </pc:picChg>
+      </pc:sldChg>
+      <pc:sldChg chg="addSp delSp modSp new">
+        <pc:chgData name="Michaeljon Miller" userId="c575fe5cddd8b8cf" providerId="LiveId" clId="{7EF091A2-6ACD-7C44-BF26-8B2484B06C9B}" dt="2020-01-07T23:21:09.243" v="1242" actId="20577"/>
+        <pc:sldMkLst>
+          <pc:docMk/>
+          <pc:sldMk cId="3812959360" sldId="330"/>
+        </pc:sldMkLst>
+        <pc:spChg chg="mod">
+          <ac:chgData name="Michaeljon Miller" userId="c575fe5cddd8b8cf" providerId="LiveId" clId="{7EF091A2-6ACD-7C44-BF26-8B2484B06C9B}" dt="2020-01-07T23:21:09.243" v="1242" actId="20577"/>
+          <ac:spMkLst>
+            <pc:docMk/>
+            <pc:sldMk cId="3812959360" sldId="330"/>
+            <ac:spMk id="2" creationId="{9BD7E18C-40EB-D147-87E6-F5FF76B87335}"/>
+          </ac:spMkLst>
+        </pc:spChg>
+        <pc:spChg chg="del">
+          <ac:chgData name="Michaeljon Miller" userId="c575fe5cddd8b8cf" providerId="LiveId" clId="{7EF091A2-6ACD-7C44-BF26-8B2484B06C9B}" dt="2020-01-07T23:16:34.703" v="707"/>
+          <ac:spMkLst>
+            <pc:docMk/>
+            <pc:sldMk cId="3812959360" sldId="330"/>
+            <ac:spMk id="3" creationId="{C103B147-E39C-AE4B-94F9-8554B67CF8F5}"/>
+          </ac:spMkLst>
+        </pc:spChg>
+        <pc:picChg chg="add mod">
+          <ac:chgData name="Michaeljon Miller" userId="c575fe5cddd8b8cf" providerId="LiveId" clId="{7EF091A2-6ACD-7C44-BF26-8B2484B06C9B}" dt="2020-01-07T23:16:34.703" v="707"/>
+          <ac:picMkLst>
+            <pc:docMk/>
+            <pc:sldMk cId="3812959360" sldId="330"/>
+            <ac:picMk id="4" creationId="{DE99FB21-D698-DF44-97F5-32CA760B9514}"/>
+          </ac:picMkLst>
+        </pc:picChg>
+      </pc:sldChg>
+      <pc:sldChg chg="addSp delSp modSp new mod modClrScheme chgLayout">
+        <pc:chgData name="Michaeljon Miller" userId="c575fe5cddd8b8cf" providerId="LiveId" clId="{7EF091A2-6ACD-7C44-BF26-8B2484B06C9B}" dt="2020-01-07T23:17:20.727" v="807" actId="20577"/>
+        <pc:sldMkLst>
+          <pc:docMk/>
+          <pc:sldMk cId="2744596274" sldId="331"/>
+        </pc:sldMkLst>
+        <pc:spChg chg="del mod ord">
+          <ac:chgData name="Michaeljon Miller" userId="c575fe5cddd8b8cf" providerId="LiveId" clId="{7EF091A2-6ACD-7C44-BF26-8B2484B06C9B}" dt="2020-01-07T23:17:00.571" v="709" actId="700"/>
+          <ac:spMkLst>
+            <pc:docMk/>
+            <pc:sldMk cId="2744596274" sldId="331"/>
+            <ac:spMk id="2" creationId="{3A88451D-ADD4-3A4B-B6CB-7998ED4697D5}"/>
+          </ac:spMkLst>
+        </pc:spChg>
+        <pc:spChg chg="del mod ord">
+          <ac:chgData name="Michaeljon Miller" userId="c575fe5cddd8b8cf" providerId="LiveId" clId="{7EF091A2-6ACD-7C44-BF26-8B2484B06C9B}" dt="2020-01-07T23:17:00.571" v="709" actId="700"/>
+          <ac:spMkLst>
+            <pc:docMk/>
+            <pc:sldMk cId="2744596274" sldId="331"/>
+            <ac:spMk id="3" creationId="{9CA35C64-87C1-A64C-A6B2-BFA4165F7A7B}"/>
+          </ac:spMkLst>
+        </pc:spChg>
+        <pc:spChg chg="add mod ord">
+          <ac:chgData name="Michaeljon Miller" userId="c575fe5cddd8b8cf" providerId="LiveId" clId="{7EF091A2-6ACD-7C44-BF26-8B2484B06C9B}" dt="2020-01-07T23:17:10.767" v="747" actId="20577"/>
+          <ac:spMkLst>
+            <pc:docMk/>
+            <pc:sldMk cId="2744596274" sldId="331"/>
+            <ac:spMk id="4" creationId="{FB33F338-992D-F04D-B0E3-928DB2F89D6F}"/>
+          </ac:spMkLst>
+        </pc:spChg>
+        <pc:spChg chg="add mod ord">
+          <ac:chgData name="Michaeljon Miller" userId="c575fe5cddd8b8cf" providerId="LiveId" clId="{7EF091A2-6ACD-7C44-BF26-8B2484B06C9B}" dt="2020-01-07T23:17:20.727" v="807" actId="20577"/>
+          <ac:spMkLst>
+            <pc:docMk/>
+            <pc:sldMk cId="2744596274" sldId="331"/>
+            <ac:spMk id="5" creationId="{6D7A236F-D50F-4845-AC5A-A9729584299B}"/>
+          </ac:spMkLst>
+        </pc:spChg>
+      </pc:sldChg>
+      <pc:sldChg chg="addSp delSp modSp new mod modClrScheme chgLayout">
+        <pc:chgData name="Michaeljon Miller" userId="c575fe5cddd8b8cf" providerId="LiveId" clId="{7EF091A2-6ACD-7C44-BF26-8B2484B06C9B}" dt="2020-01-07T23:40:47.157" v="1573" actId="5793"/>
+        <pc:sldMkLst>
+          <pc:docMk/>
+          <pc:sldMk cId="1689033397" sldId="332"/>
+        </pc:sldMkLst>
+        <pc:spChg chg="mod ord">
+          <ac:chgData name="Michaeljon Miller" userId="c575fe5cddd8b8cf" providerId="LiveId" clId="{7EF091A2-6ACD-7C44-BF26-8B2484B06C9B}" dt="2020-01-07T23:39:01.003" v="1348" actId="1076"/>
+          <ac:spMkLst>
+            <pc:docMk/>
+            <pc:sldMk cId="1689033397" sldId="332"/>
+            <ac:spMk id="2" creationId="{29FA921E-2BAE-AB43-BBDD-07D20E7B22DF}"/>
+          </ac:spMkLst>
+        </pc:spChg>
+        <pc:spChg chg="del">
+          <ac:chgData name="Michaeljon Miller" userId="c575fe5cddd8b8cf" providerId="LiveId" clId="{7EF091A2-6ACD-7C44-BF26-8B2484B06C9B}" dt="2020-01-07T23:35:59.748" v="1305"/>
+          <ac:spMkLst>
+            <pc:docMk/>
+            <pc:sldMk cId="1689033397" sldId="332"/>
+            <ac:spMk id="3" creationId="{F312BD8B-35CE-2045-BBB5-C7EA7AEE2C13}"/>
+          </ac:spMkLst>
+        </pc:spChg>
+        <pc:spChg chg="add del mod ord">
+          <ac:chgData name="Michaeljon Miller" userId="c575fe5cddd8b8cf" providerId="LiveId" clId="{7EF091A2-6ACD-7C44-BF26-8B2484B06C9B}" dt="2020-01-07T23:36:46.874" v="1340" actId="478"/>
+          <ac:spMkLst>
+            <pc:docMk/>
+            <pc:sldMk cId="1689033397" sldId="332"/>
+            <ac:spMk id="5" creationId="{CF0F0FC5-192A-9D41-9B0E-B3CDEB01AA59}"/>
+          </ac:spMkLst>
+        </pc:spChg>
+        <pc:spChg chg="add del mod">
+          <ac:chgData name="Michaeljon Miller" userId="c575fe5cddd8b8cf" providerId="LiveId" clId="{7EF091A2-6ACD-7C44-BF26-8B2484B06C9B}" dt="2020-01-07T23:39:09.198" v="1349"/>
+          <ac:spMkLst>
+            <pc:docMk/>
+            <pc:sldMk cId="1689033397" sldId="332"/>
+            <ac:spMk id="6" creationId="{6520B80F-5EC5-5A4D-971C-294F4CF7E3BF}"/>
+          </ac:spMkLst>
+        </pc:spChg>
+        <pc:spChg chg="add del mod">
+          <ac:chgData name="Michaeljon Miller" userId="c575fe5cddd8b8cf" providerId="LiveId" clId="{7EF091A2-6ACD-7C44-BF26-8B2484B06C9B}" dt="2020-01-07T23:39:09.198" v="1349"/>
+          <ac:spMkLst>
+            <pc:docMk/>
+            <pc:sldMk cId="1689033397" sldId="332"/>
+            <ac:spMk id="7" creationId="{B44A005F-527A-034B-A111-AD639ACDD0A7}"/>
+          </ac:spMkLst>
+        </pc:spChg>
+        <pc:spChg chg="add mod">
+          <ac:chgData name="Michaeljon Miller" userId="c575fe5cddd8b8cf" providerId="LiveId" clId="{7EF091A2-6ACD-7C44-BF26-8B2484B06C9B}" dt="2020-01-07T23:40:47.157" v="1573" actId="5793"/>
+          <ac:spMkLst>
+            <pc:docMk/>
+            <pc:sldMk cId="1689033397" sldId="332"/>
+            <ac:spMk id="8" creationId="{99E898C1-43E2-2148-BCF6-6611605BAA2D}"/>
+          </ac:spMkLst>
+        </pc:spChg>
+        <pc:picChg chg="add mod ord">
+          <ac:chgData name="Michaeljon Miller" userId="c575fe5cddd8b8cf" providerId="LiveId" clId="{7EF091A2-6ACD-7C44-BF26-8B2484B06C9B}" dt="2020-01-07T23:36:26.835" v="1329" actId="700"/>
+          <ac:picMkLst>
+            <pc:docMk/>
+            <pc:sldMk cId="1689033397" sldId="332"/>
+            <ac:picMk id="4" creationId="{878B8BE8-BB37-6944-8541-C993DA007DEF}"/>
+          </ac:picMkLst>
+        </pc:picChg>
+      </pc:sldChg>
+      <pc:sldChg chg="addSp delSp modSp new del mod ord modClrScheme chgLayout">
+        <pc:chgData name="Michaeljon Miller" userId="c575fe5cddd8b8cf" providerId="LiveId" clId="{7EF091A2-6ACD-7C44-BF26-8B2484B06C9B}" dt="2020-01-07T23:23:10.698" v="1303" actId="2696"/>
+        <pc:sldMkLst>
+          <pc:docMk/>
+          <pc:sldMk cId="2611083028" sldId="332"/>
+        </pc:sldMkLst>
+        <pc:spChg chg="mod ord">
+          <ac:chgData name="Michaeljon Miller" userId="c575fe5cddd8b8cf" providerId="LiveId" clId="{7EF091A2-6ACD-7C44-BF26-8B2484B06C9B}" dt="2020-01-07T23:21:35.703" v="1258" actId="700"/>
+          <ac:spMkLst>
+            <pc:docMk/>
+            <pc:sldMk cId="2611083028" sldId="332"/>
+            <ac:spMk id="2" creationId="{BC506DD8-00AF-C841-8EA6-5341A3B10333}"/>
+          </ac:spMkLst>
+        </pc:spChg>
+        <pc:spChg chg="del mod ord">
+          <ac:chgData name="Michaeljon Miller" userId="c575fe5cddd8b8cf" providerId="LiveId" clId="{7EF091A2-6ACD-7C44-BF26-8B2484B06C9B}" dt="2020-01-07T23:21:35.703" v="1258" actId="700"/>
+          <ac:spMkLst>
+            <pc:docMk/>
+            <pc:sldMk cId="2611083028" sldId="332"/>
+            <ac:spMk id="3" creationId="{F842AB87-2689-6A4F-B942-DFE2BD385688}"/>
+          </ac:spMkLst>
+        </pc:spChg>
+        <pc:spChg chg="add mod ord">
+          <ac:chgData name="Michaeljon Miller" userId="c575fe5cddd8b8cf" providerId="LiveId" clId="{7EF091A2-6ACD-7C44-BF26-8B2484B06C9B}" dt="2020-01-07T23:21:45.219" v="1300" actId="20577"/>
+          <ac:spMkLst>
+            <pc:docMk/>
+            <pc:sldMk cId="2611083028" sldId="332"/>
+            <ac:spMk id="4" creationId="{759A3B7D-99FE-764C-A8CB-D300ABB620DD}"/>
+          </ac:spMkLst>
+        </pc:spChg>
+      </pc:sldChg>
+      <pc:sldChg chg="modSp new">
+        <pc:chgData name="Michaeljon Miller" userId="c575fe5cddd8b8cf" providerId="LiveId" clId="{7EF091A2-6ACD-7C44-BF26-8B2484B06C9B}" dt="2020-01-07T23:42:58.136" v="1791" actId="20577"/>
+        <pc:sldMkLst>
+          <pc:docMk/>
+          <pc:sldMk cId="2764439232" sldId="333"/>
+        </pc:sldMkLst>
+        <pc:spChg chg="mod">
+          <ac:chgData name="Michaeljon Miller" userId="c575fe5cddd8b8cf" providerId="LiveId" clId="{7EF091A2-6ACD-7C44-BF26-8B2484B06C9B}" dt="2020-01-07T23:41:48.783" v="1599" actId="20577"/>
+          <ac:spMkLst>
+            <pc:docMk/>
+            <pc:sldMk cId="2764439232" sldId="333"/>
+            <ac:spMk id="2" creationId="{8E88CEC7-E63A-494C-9BC2-DB90A7014CD6}"/>
+          </ac:spMkLst>
+        </pc:spChg>
+        <pc:spChg chg="mod">
+          <ac:chgData name="Michaeljon Miller" userId="c575fe5cddd8b8cf" providerId="LiveId" clId="{7EF091A2-6ACD-7C44-BF26-8B2484B06C9B}" dt="2020-01-07T23:42:58.136" v="1791" actId="20577"/>
+          <ac:spMkLst>
+            <pc:docMk/>
+            <pc:sldMk cId="2764439232" sldId="333"/>
+            <ac:spMk id="3" creationId="{FB271E12-C72C-F04C-A888-26907388E52C}"/>
           </ac:spMkLst>
         </pc:spChg>
       </pc:sldChg>
@@ -650,7 +1231,7 @@
           <a:p>
             <a:fld id="{B30C5654-8255-4741-B5E4-F40A45C3546B}" type="datetimeFigureOut">
               <a:rPr lang="en-US" smtClean="0"/>
-              <a:t>12/31/19</a:t>
+              <a:t>1/7/20</a:t>
             </a:fld>
             <a:endParaRPr lang="en-US"/>
           </a:p>
@@ -961,10 +1542,7 @@
           <a:bodyPr/>
           <a:lstStyle/>
           <a:p>
-            <a:r>
-              <a:rPr lang="en-US" dirty="0"/>
-              <a:t>Don’t confuse this use of the word “style” with its use in describing personalization or fashion. Architectural style as applied to building architecture is closer in nature to that which we’re discussing here, but also tends to reflect the local ruler’s personal tastes. We don’t want personality or taste to govern our architectural decisions.</a:t>
-            </a:r>
+            <a:endParaRPr lang="en-US" dirty="0"/>
           </a:p>
         </p:txBody>
       </p:sp>
@@ -975,7 +1553,7 @@
             <a:spLocks noGrp="1"/>
           </p:cNvSpPr>
           <p:nvPr>
-            <p:ph type="sldNum" sz="quarter" idx="10"/>
+            <p:ph type="sldNum" sz="quarter" idx="5"/>
           </p:nvPr>
         </p:nvSpPr>
         <p:spPr/>
@@ -985,7 +1563,94 @@
           <a:p>
             <a:fld id="{E58294B0-43FA-4697-A94A-C7D8A3CEE26B}" type="slidenum">
               <a:rPr lang="en-US" smtClean="0"/>
-              <a:t>11</a:t>
+              <a:t>10</a:t>
+            </a:fld>
+            <a:endParaRPr lang="en-US"/>
+          </a:p>
+        </p:txBody>
+      </p:sp>
+    </p:spTree>
+    <p:extLst>
+      <p:ext uri="{BB962C8B-B14F-4D97-AF65-F5344CB8AC3E}">
+        <p14:creationId xmlns:p14="http://schemas.microsoft.com/office/powerpoint/2010/main" val="1342721794"/>
+      </p:ext>
+    </p:extLst>
+  </p:cSld>
+  <p:clrMapOvr>
+    <a:masterClrMapping/>
+  </p:clrMapOvr>
+</p:notes>
+</file>
+
+<file path=ppt/notesSlides/notesSlide2.xml><?xml version="1.0" encoding="utf-8"?>
+<p:notes xmlns:a="http://schemas.openxmlformats.org/drawingml/2006/main" xmlns:r="http://schemas.openxmlformats.org/officeDocument/2006/relationships" xmlns:p="http://schemas.openxmlformats.org/presentationml/2006/main">
+  <p:cSld>
+    <p:spTree>
+      <p:nvGrpSpPr>
+        <p:cNvPr id="1" name=""/>
+        <p:cNvGrpSpPr/>
+        <p:nvPr/>
+      </p:nvGrpSpPr>
+      <p:grpSpPr>
+        <a:xfrm>
+          <a:off x="0" y="0"/>
+          <a:ext cx="0" cy="0"/>
+          <a:chOff x="0" y="0"/>
+          <a:chExt cx="0" cy="0"/>
+        </a:xfrm>
+      </p:grpSpPr>
+      <p:sp>
+        <p:nvSpPr>
+          <p:cNvPr id="2" name="Slide Image Placeholder 1"/>
+          <p:cNvSpPr>
+            <a:spLocks noGrp="1" noRot="1" noChangeAspect="1"/>
+          </p:cNvSpPr>
+          <p:nvPr>
+            <p:ph type="sldImg"/>
+          </p:nvPr>
+        </p:nvSpPr>
+        <p:spPr/>
+      </p:sp>
+      <p:sp>
+        <p:nvSpPr>
+          <p:cNvPr id="3" name="Notes Placeholder 2"/>
+          <p:cNvSpPr>
+            <a:spLocks noGrp="1"/>
+          </p:cNvSpPr>
+          <p:nvPr>
+            <p:ph type="body" idx="1"/>
+          </p:nvPr>
+        </p:nvSpPr>
+        <p:spPr/>
+        <p:txBody>
+          <a:bodyPr/>
+          <a:lstStyle/>
+          <a:p>
+            <a:r>
+              <a:rPr lang="en-US" dirty="0"/>
+              <a:t>Don’t confuse this use of the word “style” with its use in describing personalization or fashion. Architectural style as applied to building architecture is closer in nature to that which we’re discussing here, but also tends to reflect the local ruler’s personal tastes. We don’t want personality or taste to govern our architectural decisions.</a:t>
+            </a:r>
+          </a:p>
+        </p:txBody>
+      </p:sp>
+      <p:sp>
+        <p:nvSpPr>
+          <p:cNvPr id="4" name="Slide Number Placeholder 3"/>
+          <p:cNvSpPr>
+            <a:spLocks noGrp="1"/>
+          </p:cNvSpPr>
+          <p:nvPr>
+            <p:ph type="sldNum" sz="quarter" idx="10"/>
+          </p:nvPr>
+        </p:nvSpPr>
+        <p:spPr/>
+        <p:txBody>
+          <a:bodyPr/>
+          <a:lstStyle/>
+          <a:p>
+            <a:fld id="{E58294B0-43FA-4697-A94A-C7D8A3CEE26B}" type="slidenum">
+              <a:rPr lang="en-US" smtClean="0"/>
+              <a:t>12</a:t>
             </a:fld>
             <a:endParaRPr lang="en-US"/>
           </a:p>
@@ -995,6 +1660,90 @@
     <p:extLst>
       <p:ext uri="{BB962C8B-B14F-4D97-AF65-F5344CB8AC3E}">
         <p14:creationId xmlns:p14="http://schemas.microsoft.com/office/powerpoint/2010/main" val="338711787"/>
+      </p:ext>
+    </p:extLst>
+  </p:cSld>
+  <p:clrMapOvr>
+    <a:masterClrMapping/>
+  </p:clrMapOvr>
+</p:notes>
+</file>
+
+<file path=ppt/notesSlides/notesSlide3.xml><?xml version="1.0" encoding="utf-8"?>
+<p:notes xmlns:a="http://schemas.openxmlformats.org/drawingml/2006/main" xmlns:r="http://schemas.openxmlformats.org/officeDocument/2006/relationships" xmlns:p="http://schemas.openxmlformats.org/presentationml/2006/main">
+  <p:cSld>
+    <p:spTree>
+      <p:nvGrpSpPr>
+        <p:cNvPr id="1" name=""/>
+        <p:cNvGrpSpPr/>
+        <p:nvPr/>
+      </p:nvGrpSpPr>
+      <p:grpSpPr>
+        <a:xfrm>
+          <a:off x="0" y="0"/>
+          <a:ext cx="0" cy="0"/>
+          <a:chOff x="0" y="0"/>
+          <a:chExt cx="0" cy="0"/>
+        </a:xfrm>
+      </p:grpSpPr>
+      <p:sp>
+        <p:nvSpPr>
+          <p:cNvPr id="2" name="Slide Image Placeholder 1"/>
+          <p:cNvSpPr>
+            <a:spLocks noGrp="1" noRot="1" noChangeAspect="1"/>
+          </p:cNvSpPr>
+          <p:nvPr>
+            <p:ph type="sldImg"/>
+          </p:nvPr>
+        </p:nvSpPr>
+        <p:spPr/>
+      </p:sp>
+      <p:sp>
+        <p:nvSpPr>
+          <p:cNvPr id="3" name="Notes Placeholder 2"/>
+          <p:cNvSpPr>
+            <a:spLocks noGrp="1"/>
+          </p:cNvSpPr>
+          <p:nvPr>
+            <p:ph type="body" idx="1"/>
+          </p:nvPr>
+        </p:nvSpPr>
+        <p:spPr/>
+        <p:txBody>
+          <a:bodyPr/>
+          <a:lstStyle/>
+          <a:p>
+            <a:endParaRPr lang="en-US" dirty="0"/>
+          </a:p>
+        </p:txBody>
+      </p:sp>
+      <p:sp>
+        <p:nvSpPr>
+          <p:cNvPr id="4" name="Slide Number Placeholder 3"/>
+          <p:cNvSpPr>
+            <a:spLocks noGrp="1"/>
+          </p:cNvSpPr>
+          <p:nvPr>
+            <p:ph type="sldNum" sz="quarter" idx="5"/>
+          </p:nvPr>
+        </p:nvSpPr>
+        <p:spPr/>
+        <p:txBody>
+          <a:bodyPr/>
+          <a:lstStyle/>
+          <a:p>
+            <a:fld id="{E58294B0-43FA-4697-A94A-C7D8A3CEE26B}" type="slidenum">
+              <a:rPr lang="en-US" smtClean="0"/>
+              <a:t>13</a:t>
+            </a:fld>
+            <a:endParaRPr lang="en-US"/>
+          </a:p>
+        </p:txBody>
+      </p:sp>
+    </p:spTree>
+    <p:extLst>
+      <p:ext uri="{BB962C8B-B14F-4D97-AF65-F5344CB8AC3E}">
+        <p14:creationId xmlns:p14="http://schemas.microsoft.com/office/powerpoint/2010/main" val="2658008805"/>
       </p:ext>
     </p:extLst>
   </p:cSld>
@@ -1151,7 +1900,7 @@
           <a:p>
             <a:fld id="{1E1327A7-1338-42E3-A376-4DBDA53A9DB0}" type="datetimeFigureOut">
               <a:rPr lang="en-US" smtClean="0"/>
-              <a:t>12/31/19</a:t>
+              <a:t>1/7/20</a:t>
             </a:fld>
             <a:endParaRPr lang="en-US"/>
           </a:p>
@@ -1349,7 +2098,7 @@
           <a:p>
             <a:fld id="{1E1327A7-1338-42E3-A376-4DBDA53A9DB0}" type="datetimeFigureOut">
               <a:rPr lang="en-US" smtClean="0"/>
-              <a:t>12/31/19</a:t>
+              <a:t>1/7/20</a:t>
             </a:fld>
             <a:endParaRPr lang="en-US"/>
           </a:p>
@@ -1557,7 +2306,7 @@
           <a:p>
             <a:fld id="{1E1327A7-1338-42E3-A376-4DBDA53A9DB0}" type="datetimeFigureOut">
               <a:rPr lang="en-US" smtClean="0"/>
-              <a:t>12/31/19</a:t>
+              <a:t>1/7/20</a:t>
             </a:fld>
             <a:endParaRPr lang="en-US"/>
           </a:p>
@@ -1755,7 +2504,7 @@
           <a:p>
             <a:fld id="{1E1327A7-1338-42E3-A376-4DBDA53A9DB0}" type="datetimeFigureOut">
               <a:rPr lang="en-US" smtClean="0"/>
-              <a:t>12/31/19</a:t>
+              <a:t>1/7/20</a:t>
             </a:fld>
             <a:endParaRPr lang="en-US"/>
           </a:p>
@@ -2030,7 +2779,7 @@
           <a:p>
             <a:fld id="{1E1327A7-1338-42E3-A376-4DBDA53A9DB0}" type="datetimeFigureOut">
               <a:rPr lang="en-US" smtClean="0"/>
-              <a:t>12/31/19</a:t>
+              <a:t>1/7/20</a:t>
             </a:fld>
             <a:endParaRPr lang="en-US"/>
           </a:p>
@@ -2295,7 +3044,7 @@
           <a:p>
             <a:fld id="{1E1327A7-1338-42E3-A376-4DBDA53A9DB0}" type="datetimeFigureOut">
               <a:rPr lang="en-US" smtClean="0"/>
-              <a:t>12/31/19</a:t>
+              <a:t>1/7/20</a:t>
             </a:fld>
             <a:endParaRPr lang="en-US"/>
           </a:p>
@@ -2707,7 +3456,7 @@
           <a:p>
             <a:fld id="{1E1327A7-1338-42E3-A376-4DBDA53A9DB0}" type="datetimeFigureOut">
               <a:rPr lang="en-US" smtClean="0"/>
-              <a:t>12/31/19</a:t>
+              <a:t>1/7/20</a:t>
             </a:fld>
             <a:endParaRPr lang="en-US"/>
           </a:p>
@@ -2848,7 +3597,7 @@
           <a:p>
             <a:fld id="{1E1327A7-1338-42E3-A376-4DBDA53A9DB0}" type="datetimeFigureOut">
               <a:rPr lang="en-US" smtClean="0"/>
-              <a:t>12/31/19</a:t>
+              <a:t>1/7/20</a:t>
             </a:fld>
             <a:endParaRPr lang="en-US"/>
           </a:p>
@@ -2961,7 +3710,7 @@
           <a:p>
             <a:fld id="{1E1327A7-1338-42E3-A376-4DBDA53A9DB0}" type="datetimeFigureOut">
               <a:rPr lang="en-US" smtClean="0"/>
-              <a:t>12/31/19</a:t>
+              <a:t>1/7/20</a:t>
             </a:fld>
             <a:endParaRPr lang="en-US"/>
           </a:p>
@@ -3272,7 +4021,7 @@
           <a:p>
             <a:fld id="{1E1327A7-1338-42E3-A376-4DBDA53A9DB0}" type="datetimeFigureOut">
               <a:rPr lang="en-US" smtClean="0"/>
-              <a:t>12/31/19</a:t>
+              <a:t>1/7/20</a:t>
             </a:fld>
             <a:endParaRPr lang="en-US"/>
           </a:p>
@@ -3560,7 +4309,7 @@
           <a:p>
             <a:fld id="{1E1327A7-1338-42E3-A376-4DBDA53A9DB0}" type="datetimeFigureOut">
               <a:rPr lang="en-US" smtClean="0"/>
-              <a:t>12/31/19</a:t>
+              <a:t>1/7/20</a:t>
             </a:fld>
             <a:endParaRPr lang="en-US"/>
           </a:p>
@@ -3801,7 +4550,7 @@
           <a:p>
             <a:fld id="{1E1327A7-1338-42E3-A376-4DBDA53A9DB0}" type="datetimeFigureOut">
               <a:rPr lang="en-US" smtClean="0"/>
-              <a:t>12/31/19</a:t>
+              <a:t>1/7/20</a:t>
             </a:fld>
             <a:endParaRPr lang="en-US"/>
           </a:p>
@@ -4309,7 +5058,7 @@
           <p:cNvPr id="2" name="Title 1">
             <a:extLst>
               <a:ext uri="{FF2B5EF4-FFF2-40B4-BE49-F238E27FC236}">
-                <a16:creationId xmlns:a16="http://schemas.microsoft.com/office/drawing/2014/main" id="{5408150A-D84D-E645-9E33-A1392FE8704F}"/>
+                <a16:creationId xmlns:a16="http://schemas.microsoft.com/office/drawing/2014/main" id="{957309F5-C9EE-1E4C-B839-B1A47EFAE97A}"/>
               </a:ext>
             </a:extLst>
           </p:cNvPr>
@@ -4327,7 +5076,7 @@
           <a:p>
             <a:r>
               <a:rPr lang="en-US" dirty="0"/>
-              <a:t>So, what elements?</a:t>
+              <a:t>What is this architecture thing?</a:t>
             </a:r>
           </a:p>
         </p:txBody>
@@ -4337,7 +5086,7 @@
           <p:cNvPr id="3" name="Content Placeholder 2">
             <a:extLst>
               <a:ext uri="{FF2B5EF4-FFF2-40B4-BE49-F238E27FC236}">
-                <a16:creationId xmlns:a16="http://schemas.microsoft.com/office/drawing/2014/main" id="{DF1C7B13-8199-864D-8C76-882AA0DDF815}"/>
+                <a16:creationId xmlns:a16="http://schemas.microsoft.com/office/drawing/2014/main" id="{B62E1A3E-F38E-904B-B8F7-D5A1398467AD}"/>
               </a:ext>
             </a:extLst>
           </p:cNvPr>
@@ -4350,7 +5099,9 @@
         </p:nvSpPr>
         <p:spPr/>
         <p:txBody>
-          <a:bodyPr/>
+          <a:bodyPr>
+            <a:normAutofit/>
+          </a:bodyPr>
           <a:lstStyle/>
           <a:p>
             <a:pPr marL="0" indent="0">
@@ -4358,66 +5109,24 @@
             </a:pPr>
             <a:r>
               <a:rPr lang="en-US" dirty="0"/>
-              <a:t>A </a:t>
+              <a:t>Run-time abstraction view</a:t>
+            </a:r>
+          </a:p>
+          <a:p>
+            <a:pPr marL="457200" lvl="1" indent="0">
+              <a:buNone/>
+            </a:pPr>
+            <a:r>
+              <a:rPr lang="en-US" dirty="0"/>
+              <a:t>A </a:t>
             </a:r>
             <a:r>
               <a:rPr lang="en-US" b="1" dirty="0"/>
-              <a:t>component</a:t>
-            </a:r>
-            <a:r>
-              <a:rPr lang="en-US" dirty="0"/>
-              <a:t> is an abstract unit of software instructions and internal state that provides a transformation of data via its interface.</a:t>
-            </a:r>
-          </a:p>
-          <a:p>
-            <a:pPr marL="0" indent="0">
-              <a:buNone/>
-            </a:pPr>
-            <a:r>
-              <a:rPr lang="en-US" dirty="0"/>
-              <a:t>A </a:t>
-            </a:r>
-            <a:r>
-              <a:rPr lang="en-US" b="1" dirty="0"/>
-              <a:t>connector</a:t>
-            </a:r>
-            <a:r>
-              <a:rPr lang="en-US" dirty="0"/>
-              <a:t> is an abstract mechanism that mediates communication, coordination, or cooperation among components.</a:t>
-            </a:r>
-          </a:p>
-          <a:p>
-            <a:pPr marL="0" indent="0">
-              <a:buNone/>
-            </a:pPr>
-            <a:r>
-              <a:rPr lang="en-US" dirty="0"/>
-              <a:t>A </a:t>
-            </a:r>
-            <a:r>
-              <a:rPr lang="en-US" b="1" dirty="0"/>
-              <a:t>datum</a:t>
-            </a:r>
-            <a:r>
-              <a:rPr lang="en-US" dirty="0"/>
-              <a:t> is an element of information that is transferred from a component, or received by a component, via a connector.</a:t>
-            </a:r>
-          </a:p>
-          <a:p>
-            <a:pPr marL="0" indent="0">
-              <a:buNone/>
-            </a:pPr>
-            <a:r>
-              <a:rPr lang="en-US" dirty="0"/>
-              <a:t>A </a:t>
-            </a:r>
-            <a:r>
-              <a:rPr lang="en-US" b="1" dirty="0"/>
-              <a:t>configuration</a:t>
-            </a:r>
-            <a:r>
-              <a:rPr lang="en-US" dirty="0"/>
-              <a:t> is the structure of architectural relationships among components, connectors, and data during a period of system run-time.</a:t>
+              <a:t>software architecture </a:t>
+            </a:r>
+            <a:r>
+              <a:rPr lang="en-US" dirty="0"/>
+              <a:t>is an abstraction of the run-time elements of a software system during some phase of its operation. A system may be composed of many levels of abstraction and many phases of operation, each with its own software architecture.</a:t>
             </a:r>
           </a:p>
           <a:p>
@@ -4425,13 +5134,39 @@
               <a:buNone/>
             </a:pPr>
             <a:endParaRPr lang="en-US" dirty="0"/>
+          </a:p>
+          <a:p>
+            <a:pPr marL="0" indent="0">
+              <a:buNone/>
+            </a:pPr>
+            <a:r>
+              <a:rPr lang="en-US" dirty="0"/>
+              <a:t>Elemental view</a:t>
+            </a:r>
+          </a:p>
+          <a:p>
+            <a:pPr marL="457200" lvl="1" indent="0">
+              <a:buNone/>
+            </a:pPr>
+            <a:r>
+              <a:rPr lang="en-US" dirty="0"/>
+              <a:t>A </a:t>
+            </a:r>
+            <a:r>
+              <a:rPr lang="en-US" b="1" dirty="0"/>
+              <a:t>software architecture</a:t>
+            </a:r>
+            <a:r>
+              <a:rPr lang="en-US" dirty="0"/>
+              <a:t> is defined by a configuration of architectural elements - components, connectors, and data - constrained in their relationships in order to achieve a desired set of architectural properties.</a:t>
+            </a:r>
           </a:p>
         </p:txBody>
       </p:sp>
     </p:spTree>
     <p:extLst>
       <p:ext uri="{BB962C8B-B14F-4D97-AF65-F5344CB8AC3E}">
-        <p14:creationId xmlns:p14="http://schemas.microsoft.com/office/powerpoint/2010/main" val="4172525580"/>
+        <p14:creationId xmlns:p14="http://schemas.microsoft.com/office/powerpoint/2010/main" val="657190373"/>
       </p:ext>
     </p:extLst>
   </p:cSld>
@@ -4463,6 +5198,160 @@
           <p:cNvPr id="2" name="Title 1">
             <a:extLst>
               <a:ext uri="{FF2B5EF4-FFF2-40B4-BE49-F238E27FC236}">
+                <a16:creationId xmlns:a16="http://schemas.microsoft.com/office/drawing/2014/main" id="{5408150A-D84D-E645-9E33-A1392FE8704F}"/>
+              </a:ext>
+            </a:extLst>
+          </p:cNvPr>
+          <p:cNvSpPr>
+            <a:spLocks noGrp="1"/>
+          </p:cNvSpPr>
+          <p:nvPr>
+            <p:ph type="title"/>
+          </p:nvPr>
+        </p:nvSpPr>
+        <p:spPr/>
+        <p:txBody>
+          <a:bodyPr/>
+          <a:lstStyle/>
+          <a:p>
+            <a:r>
+              <a:rPr lang="en-US" dirty="0"/>
+              <a:t>So, what elements?</a:t>
+            </a:r>
+          </a:p>
+        </p:txBody>
+      </p:sp>
+      <p:sp>
+        <p:nvSpPr>
+          <p:cNvPr id="3" name="Content Placeholder 2">
+            <a:extLst>
+              <a:ext uri="{FF2B5EF4-FFF2-40B4-BE49-F238E27FC236}">
+                <a16:creationId xmlns:a16="http://schemas.microsoft.com/office/drawing/2014/main" id="{DF1C7B13-8199-864D-8C76-882AA0DDF815}"/>
+              </a:ext>
+            </a:extLst>
+          </p:cNvPr>
+          <p:cNvSpPr>
+            <a:spLocks noGrp="1"/>
+          </p:cNvSpPr>
+          <p:nvPr>
+            <p:ph idx="1"/>
+          </p:nvPr>
+        </p:nvSpPr>
+        <p:spPr/>
+        <p:txBody>
+          <a:bodyPr/>
+          <a:lstStyle/>
+          <a:p>
+            <a:pPr marL="0" indent="0">
+              <a:buNone/>
+            </a:pPr>
+            <a:r>
+              <a:rPr lang="en-US" dirty="0"/>
+              <a:t>A </a:t>
+            </a:r>
+            <a:r>
+              <a:rPr lang="en-US" b="1" dirty="0"/>
+              <a:t>component</a:t>
+            </a:r>
+            <a:r>
+              <a:rPr lang="en-US" dirty="0"/>
+              <a:t> is an abstract unit of software instructions and internal state that provides a transformation of data via its interface.</a:t>
+            </a:r>
+          </a:p>
+          <a:p>
+            <a:pPr marL="0" indent="0">
+              <a:buNone/>
+            </a:pPr>
+            <a:r>
+              <a:rPr lang="en-US" dirty="0"/>
+              <a:t>A </a:t>
+            </a:r>
+            <a:r>
+              <a:rPr lang="en-US" b="1" dirty="0"/>
+              <a:t>connector</a:t>
+            </a:r>
+            <a:r>
+              <a:rPr lang="en-US" dirty="0"/>
+              <a:t> is an abstract mechanism that mediates communication, coordination, or cooperation among components.</a:t>
+            </a:r>
+          </a:p>
+          <a:p>
+            <a:pPr marL="0" indent="0">
+              <a:buNone/>
+            </a:pPr>
+            <a:r>
+              <a:rPr lang="en-US" dirty="0"/>
+              <a:t>A </a:t>
+            </a:r>
+            <a:r>
+              <a:rPr lang="en-US" b="1" dirty="0"/>
+              <a:t>datum</a:t>
+            </a:r>
+            <a:r>
+              <a:rPr lang="en-US" dirty="0"/>
+              <a:t> is an element of information that is transferred from a component, or received by a component, via a connector.</a:t>
+            </a:r>
+          </a:p>
+          <a:p>
+            <a:pPr marL="0" indent="0">
+              <a:buNone/>
+            </a:pPr>
+            <a:r>
+              <a:rPr lang="en-US" dirty="0"/>
+              <a:t>A </a:t>
+            </a:r>
+            <a:r>
+              <a:rPr lang="en-US" b="1" dirty="0"/>
+              <a:t>configuration</a:t>
+            </a:r>
+            <a:r>
+              <a:rPr lang="en-US" dirty="0"/>
+              <a:t> is the structure of architectural relationships among components, connectors, and data during a period of system run-time.</a:t>
+            </a:r>
+          </a:p>
+          <a:p>
+            <a:pPr marL="0" indent="0">
+              <a:buNone/>
+            </a:pPr>
+            <a:endParaRPr lang="en-US" dirty="0"/>
+          </a:p>
+        </p:txBody>
+      </p:sp>
+    </p:spTree>
+    <p:extLst>
+      <p:ext uri="{BB962C8B-B14F-4D97-AF65-F5344CB8AC3E}">
+        <p14:creationId xmlns:p14="http://schemas.microsoft.com/office/powerpoint/2010/main" val="4172525580"/>
+      </p:ext>
+    </p:extLst>
+  </p:cSld>
+  <p:clrMapOvr>
+    <a:masterClrMapping/>
+  </p:clrMapOvr>
+</p:sld>
+</file>
+
+<file path=ppt/slides/slide12.xml><?xml version="1.0" encoding="utf-8"?>
+<p:sld xmlns:a="http://schemas.openxmlformats.org/drawingml/2006/main" xmlns:r="http://schemas.openxmlformats.org/officeDocument/2006/relationships" xmlns:p="http://schemas.openxmlformats.org/presentationml/2006/main">
+  <p:cSld>
+    <p:spTree>
+      <p:nvGrpSpPr>
+        <p:cNvPr id="1" name=""/>
+        <p:cNvGrpSpPr/>
+        <p:nvPr/>
+      </p:nvGrpSpPr>
+      <p:grpSpPr>
+        <a:xfrm>
+          <a:off x="0" y="0"/>
+          <a:ext cx="0" cy="0"/>
+          <a:chOff x="0" y="0"/>
+          <a:chExt cx="0" cy="0"/>
+        </a:xfrm>
+      </p:grpSpPr>
+      <p:sp>
+        <p:nvSpPr>
+          <p:cNvPr id="2" name="Title 1">
+            <a:extLst>
+              <a:ext uri="{FF2B5EF4-FFF2-40B4-BE49-F238E27FC236}">
                 <a16:creationId xmlns:a16="http://schemas.microsoft.com/office/drawing/2014/main" id="{B48E4030-9CE2-9144-B3D6-1920E39E3B14}"/>
               </a:ext>
             </a:extLst>
@@ -4534,6 +5423,684 @@
     <p:extLst>
       <p:ext uri="{BB962C8B-B14F-4D97-AF65-F5344CB8AC3E}">
         <p14:creationId xmlns:p14="http://schemas.microsoft.com/office/powerpoint/2010/main" val="1438224000"/>
+      </p:ext>
+    </p:extLst>
+  </p:cSld>
+  <p:clrMapOvr>
+    <a:masterClrMapping/>
+  </p:clrMapOvr>
+</p:sld>
+</file>
+
+<file path=ppt/slides/slide13.xml><?xml version="1.0" encoding="utf-8"?>
+<p:sld xmlns:a="http://schemas.openxmlformats.org/drawingml/2006/main" xmlns:r="http://schemas.openxmlformats.org/officeDocument/2006/relationships" xmlns:p="http://schemas.openxmlformats.org/presentationml/2006/main">
+  <p:cSld>
+    <p:spTree>
+      <p:nvGrpSpPr>
+        <p:cNvPr id="1" name=""/>
+        <p:cNvGrpSpPr/>
+        <p:nvPr/>
+      </p:nvGrpSpPr>
+      <p:grpSpPr>
+        <a:xfrm>
+          <a:off x="0" y="0"/>
+          <a:ext cx="0" cy="0"/>
+          <a:chOff x="0" y="0"/>
+          <a:chExt cx="0" cy="0"/>
+        </a:xfrm>
+      </p:grpSpPr>
+      <p:sp>
+        <p:nvSpPr>
+          <p:cNvPr id="2" name="Title 1">
+            <a:extLst>
+              <a:ext uri="{FF2B5EF4-FFF2-40B4-BE49-F238E27FC236}">
+                <a16:creationId xmlns:a16="http://schemas.microsoft.com/office/drawing/2014/main" id="{29FA921E-2BAE-AB43-BBDD-07D20E7B22DF}"/>
+              </a:ext>
+            </a:extLst>
+          </p:cNvPr>
+          <p:cNvSpPr>
+            <a:spLocks noGrp="1"/>
+          </p:cNvSpPr>
+          <p:nvPr>
+            <p:ph type="title"/>
+          </p:nvPr>
+        </p:nvSpPr>
+        <p:spPr/>
+        <p:txBody>
+          <a:bodyPr/>
+          <a:lstStyle/>
+          <a:p>
+            <a:r>
+              <a:rPr lang="en-US" dirty="0"/>
+              <a:t>Styles and patterns</a:t>
+            </a:r>
+          </a:p>
+        </p:txBody>
+      </p:sp>
+      <p:pic>
+        <p:nvPicPr>
+          <p:cNvPr id="4" name="Content Placeholder 3">
+            <a:extLst>
+              <a:ext uri="{FF2B5EF4-FFF2-40B4-BE49-F238E27FC236}">
+                <a16:creationId xmlns:a16="http://schemas.microsoft.com/office/drawing/2014/main" id="{878B8BE8-BB37-6944-8541-C993DA007DEF}"/>
+              </a:ext>
+            </a:extLst>
+          </p:cNvPr>
+          <p:cNvPicPr>
+            <a:picLocks noGrp="1" noChangeAspect="1"/>
+          </p:cNvPicPr>
+          <p:nvPr>
+            <p:ph idx="1"/>
+          </p:nvPr>
+        </p:nvPicPr>
+        <p:blipFill>
+          <a:blip r:embed="rId3"/>
+          <a:stretch>
+            <a:fillRect/>
+          </a:stretch>
+        </p:blipFill>
+        <p:spPr>
+          <a:xfrm>
+            <a:off x="5675983" y="987425"/>
+            <a:ext cx="5186610" cy="4873625"/>
+          </a:xfrm>
+        </p:spPr>
+      </p:pic>
+      <p:sp>
+        <p:nvSpPr>
+          <p:cNvPr id="8" name="Text Placeholder 7">
+            <a:extLst>
+              <a:ext uri="{FF2B5EF4-FFF2-40B4-BE49-F238E27FC236}">
+                <a16:creationId xmlns:a16="http://schemas.microsoft.com/office/drawing/2014/main" id="{99E898C1-43E2-2148-BCF6-6611605BAA2D}"/>
+              </a:ext>
+            </a:extLst>
+          </p:cNvPr>
+          <p:cNvSpPr>
+            <a:spLocks noGrp="1"/>
+          </p:cNvSpPr>
+          <p:nvPr>
+            <p:ph type="body" sz="half" idx="2"/>
+          </p:nvPr>
+        </p:nvSpPr>
+        <p:spPr/>
+        <p:txBody>
+          <a:bodyPr/>
+          <a:lstStyle/>
+          <a:p>
+            <a:r>
+              <a:rPr lang="en-US" dirty="0"/>
+              <a:t>There’s a continuum, and that’s what’s important</a:t>
+            </a:r>
+          </a:p>
+          <a:p>
+            <a:r>
+              <a:rPr lang="en-US" dirty="0"/>
+              <a:t>This course is all about the continuum</a:t>
+            </a:r>
+          </a:p>
+          <a:p>
+            <a:r>
+              <a:rPr lang="en-US" dirty="0"/>
+              <a:t>And… you want to talk about controversy…</a:t>
+            </a:r>
+          </a:p>
+        </p:txBody>
+      </p:sp>
+    </p:spTree>
+    <p:extLst>
+      <p:ext uri="{BB962C8B-B14F-4D97-AF65-F5344CB8AC3E}">
+        <p14:creationId xmlns:p14="http://schemas.microsoft.com/office/powerpoint/2010/main" val="1689033397"/>
+      </p:ext>
+    </p:extLst>
+  </p:cSld>
+  <p:clrMapOvr>
+    <a:masterClrMapping/>
+  </p:clrMapOvr>
+</p:sld>
+</file>
+
+<file path=ppt/slides/slide14.xml><?xml version="1.0" encoding="utf-8"?>
+<p:sld xmlns:a="http://schemas.openxmlformats.org/drawingml/2006/main" xmlns:r="http://schemas.openxmlformats.org/officeDocument/2006/relationships" xmlns:p="http://schemas.openxmlformats.org/presentationml/2006/main">
+  <p:cSld>
+    <p:spTree>
+      <p:nvGrpSpPr>
+        <p:cNvPr id="1" name=""/>
+        <p:cNvGrpSpPr/>
+        <p:nvPr/>
+      </p:nvGrpSpPr>
+      <p:grpSpPr>
+        <a:xfrm>
+          <a:off x="0" y="0"/>
+          <a:ext cx="0" cy="0"/>
+          <a:chOff x="0" y="0"/>
+          <a:chExt cx="0" cy="0"/>
+        </a:xfrm>
+      </p:grpSpPr>
+      <p:sp>
+        <p:nvSpPr>
+          <p:cNvPr id="4" name="Title 3">
+            <a:extLst>
+              <a:ext uri="{FF2B5EF4-FFF2-40B4-BE49-F238E27FC236}">
+                <a16:creationId xmlns:a16="http://schemas.microsoft.com/office/drawing/2014/main" id="{FB33F338-992D-F04D-B0E3-928DB2F89D6F}"/>
+              </a:ext>
+            </a:extLst>
+          </p:cNvPr>
+          <p:cNvSpPr>
+            <a:spLocks noGrp="1"/>
+          </p:cNvSpPr>
+          <p:nvPr>
+            <p:ph type="title"/>
+          </p:nvPr>
+        </p:nvSpPr>
+        <p:spPr/>
+        <p:txBody>
+          <a:bodyPr/>
+          <a:lstStyle/>
+          <a:p>
+            <a:r>
+              <a:rPr lang="en-US" dirty="0"/>
+              <a:t>Let’s look at some examples</a:t>
+            </a:r>
+          </a:p>
+        </p:txBody>
+      </p:sp>
+      <p:sp>
+        <p:nvSpPr>
+          <p:cNvPr id="5" name="Text Placeholder 4">
+            <a:extLst>
+              <a:ext uri="{FF2B5EF4-FFF2-40B4-BE49-F238E27FC236}">
+                <a16:creationId xmlns:a16="http://schemas.microsoft.com/office/drawing/2014/main" id="{6D7A236F-D50F-4845-AC5A-A9729584299B}"/>
+              </a:ext>
+            </a:extLst>
+          </p:cNvPr>
+          <p:cNvSpPr>
+            <a:spLocks noGrp="1"/>
+          </p:cNvSpPr>
+          <p:nvPr>
+            <p:ph type="body" idx="1"/>
+          </p:nvPr>
+        </p:nvSpPr>
+        <p:spPr/>
+        <p:txBody>
+          <a:bodyPr/>
+          <a:lstStyle/>
+          <a:p>
+            <a:r>
+              <a:rPr lang="en-US" dirty="0"/>
+              <a:t>These are taken from various projects that I’ve worked on</a:t>
+            </a:r>
+          </a:p>
+        </p:txBody>
+      </p:sp>
+    </p:spTree>
+    <p:extLst>
+      <p:ext uri="{BB962C8B-B14F-4D97-AF65-F5344CB8AC3E}">
+        <p14:creationId xmlns:p14="http://schemas.microsoft.com/office/powerpoint/2010/main" val="2744596274"/>
+      </p:ext>
+    </p:extLst>
+  </p:cSld>
+  <p:clrMapOvr>
+    <a:masterClrMapping/>
+  </p:clrMapOvr>
+</p:sld>
+</file>
+
+<file path=ppt/slides/slide15.xml><?xml version="1.0" encoding="utf-8"?>
+<p:sld xmlns:a="http://schemas.openxmlformats.org/drawingml/2006/main" xmlns:r="http://schemas.openxmlformats.org/officeDocument/2006/relationships" xmlns:p="http://schemas.openxmlformats.org/presentationml/2006/main">
+  <p:cSld>
+    <p:spTree>
+      <p:nvGrpSpPr>
+        <p:cNvPr id="1" name=""/>
+        <p:cNvGrpSpPr/>
+        <p:nvPr/>
+      </p:nvGrpSpPr>
+      <p:grpSpPr>
+        <a:xfrm>
+          <a:off x="0" y="0"/>
+          <a:ext cx="0" cy="0"/>
+          <a:chOff x="0" y="0"/>
+          <a:chExt cx="0" cy="0"/>
+        </a:xfrm>
+      </p:grpSpPr>
+      <p:sp>
+        <p:nvSpPr>
+          <p:cNvPr id="2" name="Title 1">
+            <a:extLst>
+              <a:ext uri="{FF2B5EF4-FFF2-40B4-BE49-F238E27FC236}">
+                <a16:creationId xmlns:a16="http://schemas.microsoft.com/office/drawing/2014/main" id="{C9898BED-61FF-EB45-BDDA-9D4ECF0DBE7D}"/>
+              </a:ext>
+            </a:extLst>
+          </p:cNvPr>
+          <p:cNvSpPr>
+            <a:spLocks noGrp="1"/>
+          </p:cNvSpPr>
+          <p:nvPr>
+            <p:ph type="title"/>
+          </p:nvPr>
+        </p:nvSpPr>
+        <p:spPr/>
+        <p:txBody>
+          <a:bodyPr/>
+          <a:lstStyle/>
+          <a:p>
+            <a:r>
+              <a:rPr lang="en-US" dirty="0"/>
+              <a:t>18-month detailed integration</a:t>
+            </a:r>
+          </a:p>
+        </p:txBody>
+      </p:sp>
+      <p:pic>
+        <p:nvPicPr>
+          <p:cNvPr id="5" name="Content Placeholder 4">
+            <a:extLst>
+              <a:ext uri="{FF2B5EF4-FFF2-40B4-BE49-F238E27FC236}">
+                <a16:creationId xmlns:a16="http://schemas.microsoft.com/office/drawing/2014/main" id="{0E15E5C5-A196-C54B-8022-71C78C04FDCE}"/>
+              </a:ext>
+            </a:extLst>
+          </p:cNvPr>
+          <p:cNvPicPr>
+            <a:picLocks noGrp="1" noChangeAspect="1"/>
+          </p:cNvPicPr>
+          <p:nvPr>
+            <p:ph idx="1"/>
+          </p:nvPr>
+        </p:nvPicPr>
+        <p:blipFill>
+          <a:blip r:embed="rId2">
+            <a:extLst>
+              <a:ext uri="{28A0092B-C50C-407E-A947-70E740481C1C}">
+                <a14:useLocalDpi xmlns:a14="http://schemas.microsoft.com/office/drawing/2010/main" val="0"/>
+              </a:ext>
+            </a:extLst>
+          </a:blip>
+          <a:stretch>
+            <a:fillRect/>
+          </a:stretch>
+        </p:blipFill>
+        <p:spPr>
+          <a:xfrm>
+            <a:off x="2992842" y="1825625"/>
+            <a:ext cx="6206315" cy="4351338"/>
+          </a:xfrm>
+        </p:spPr>
+      </p:pic>
+    </p:spTree>
+    <p:extLst>
+      <p:ext uri="{BB962C8B-B14F-4D97-AF65-F5344CB8AC3E}">
+        <p14:creationId xmlns:p14="http://schemas.microsoft.com/office/powerpoint/2010/main" val="3275625684"/>
+      </p:ext>
+    </p:extLst>
+  </p:cSld>
+  <p:clrMapOvr>
+    <a:masterClrMapping/>
+  </p:clrMapOvr>
+</p:sld>
+</file>
+
+<file path=ppt/slides/slide16.xml><?xml version="1.0" encoding="utf-8"?>
+<p:sld xmlns:a="http://schemas.openxmlformats.org/drawingml/2006/main" xmlns:r="http://schemas.openxmlformats.org/officeDocument/2006/relationships" xmlns:p="http://schemas.openxmlformats.org/presentationml/2006/main">
+  <p:cSld>
+    <p:spTree>
+      <p:nvGrpSpPr>
+        <p:cNvPr id="1" name=""/>
+        <p:cNvGrpSpPr/>
+        <p:nvPr/>
+      </p:nvGrpSpPr>
+      <p:grpSpPr>
+        <a:xfrm>
+          <a:off x="0" y="0"/>
+          <a:ext cx="0" cy="0"/>
+          <a:chOff x="0" y="0"/>
+          <a:chExt cx="0" cy="0"/>
+        </a:xfrm>
+      </p:grpSpPr>
+      <p:sp>
+        <p:nvSpPr>
+          <p:cNvPr id="6" name="Title 5">
+            <a:extLst>
+              <a:ext uri="{FF2B5EF4-FFF2-40B4-BE49-F238E27FC236}">
+                <a16:creationId xmlns:a16="http://schemas.microsoft.com/office/drawing/2014/main" id="{16AFF953-46B1-5044-9DCE-DDBD73CDC2A8}"/>
+              </a:ext>
+            </a:extLst>
+          </p:cNvPr>
+          <p:cNvSpPr>
+            <a:spLocks noGrp="1"/>
+          </p:cNvSpPr>
+          <p:nvPr>
+            <p:ph type="title"/>
+          </p:nvPr>
+        </p:nvSpPr>
+        <p:spPr/>
+        <p:txBody>
+          <a:bodyPr/>
+          <a:lstStyle/>
+          <a:p>
+            <a:r>
+              <a:rPr lang="en-US" dirty="0"/>
+              <a:t>An “application” in that model</a:t>
+            </a:r>
+          </a:p>
+        </p:txBody>
+      </p:sp>
+      <p:pic>
+        <p:nvPicPr>
+          <p:cNvPr id="5" name="Content Placeholder 4">
+            <a:extLst>
+              <a:ext uri="{FF2B5EF4-FFF2-40B4-BE49-F238E27FC236}">
+                <a16:creationId xmlns:a16="http://schemas.microsoft.com/office/drawing/2014/main" id="{19539023-B6F1-F641-9858-61A9AA5C8E5E}"/>
+              </a:ext>
+            </a:extLst>
+          </p:cNvPr>
+          <p:cNvPicPr>
+            <a:picLocks noGrp="1" noChangeAspect="1"/>
+          </p:cNvPicPr>
+          <p:nvPr>
+            <p:ph idx="1"/>
+          </p:nvPr>
+        </p:nvPicPr>
+        <p:blipFill>
+          <a:blip r:embed="rId2">
+            <a:extLst>
+              <a:ext uri="{28A0092B-C50C-407E-A947-70E740481C1C}">
+                <a14:useLocalDpi xmlns:a14="http://schemas.microsoft.com/office/drawing/2010/main" val="0"/>
+              </a:ext>
+            </a:extLst>
+          </a:blip>
+          <a:stretch>
+            <a:fillRect/>
+          </a:stretch>
+        </p:blipFill>
+        <p:spPr>
+          <a:xfrm>
+            <a:off x="4553886" y="1825625"/>
+            <a:ext cx="3084228" cy="4351338"/>
+          </a:xfrm>
+        </p:spPr>
+      </p:pic>
+    </p:spTree>
+    <p:extLst>
+      <p:ext uri="{BB962C8B-B14F-4D97-AF65-F5344CB8AC3E}">
+        <p14:creationId xmlns:p14="http://schemas.microsoft.com/office/powerpoint/2010/main" val="1221676019"/>
+      </p:ext>
+    </p:extLst>
+  </p:cSld>
+  <p:clrMapOvr>
+    <a:masterClrMapping/>
+  </p:clrMapOvr>
+</p:sld>
+</file>
+
+<file path=ppt/slides/slide17.xml><?xml version="1.0" encoding="utf-8"?>
+<p:sld xmlns:a="http://schemas.openxmlformats.org/drawingml/2006/main" xmlns:r="http://schemas.openxmlformats.org/officeDocument/2006/relationships" xmlns:p="http://schemas.openxmlformats.org/presentationml/2006/main">
+  <p:cSld>
+    <p:spTree>
+      <p:nvGrpSpPr>
+        <p:cNvPr id="1" name=""/>
+        <p:cNvGrpSpPr/>
+        <p:nvPr/>
+      </p:nvGrpSpPr>
+      <p:grpSpPr>
+        <a:xfrm>
+          <a:off x="0" y="0"/>
+          <a:ext cx="0" cy="0"/>
+          <a:chOff x="0" y="0"/>
+          <a:chExt cx="0" cy="0"/>
+        </a:xfrm>
+      </p:grpSpPr>
+      <p:sp>
+        <p:nvSpPr>
+          <p:cNvPr id="2" name="Title 1">
+            <a:extLst>
+              <a:ext uri="{FF2B5EF4-FFF2-40B4-BE49-F238E27FC236}">
+                <a16:creationId xmlns:a16="http://schemas.microsoft.com/office/drawing/2014/main" id="{BD4B0C05-7F30-E643-BEF5-831E921B7E99}"/>
+              </a:ext>
+            </a:extLst>
+          </p:cNvPr>
+          <p:cNvSpPr>
+            <a:spLocks noGrp="1"/>
+          </p:cNvSpPr>
+          <p:nvPr>
+            <p:ph type="title"/>
+          </p:nvPr>
+        </p:nvSpPr>
+        <p:spPr/>
+        <p:txBody>
+          <a:bodyPr/>
+          <a:lstStyle/>
+          <a:p>
+            <a:r>
+              <a:rPr lang="en-US" dirty="0"/>
+              <a:t>One “layer” in the 18-month model</a:t>
+            </a:r>
+          </a:p>
+        </p:txBody>
+      </p:sp>
+      <p:pic>
+        <p:nvPicPr>
+          <p:cNvPr id="5" name="Content Placeholder 4">
+            <a:extLst>
+              <a:ext uri="{FF2B5EF4-FFF2-40B4-BE49-F238E27FC236}">
+                <a16:creationId xmlns:a16="http://schemas.microsoft.com/office/drawing/2014/main" id="{FA033BB2-2E93-FE40-9FC9-DAC9E8116984}"/>
+              </a:ext>
+            </a:extLst>
+          </p:cNvPr>
+          <p:cNvPicPr>
+            <a:picLocks noGrp="1" noChangeAspect="1"/>
+          </p:cNvPicPr>
+          <p:nvPr>
+            <p:ph idx="1"/>
+          </p:nvPr>
+        </p:nvPicPr>
+        <p:blipFill>
+          <a:blip r:embed="rId2">
+            <a:extLst>
+              <a:ext uri="{28A0092B-C50C-407E-A947-70E740481C1C}">
+                <a14:useLocalDpi xmlns:a14="http://schemas.microsoft.com/office/drawing/2010/main" val="0"/>
+              </a:ext>
+            </a:extLst>
+          </a:blip>
+          <a:stretch>
+            <a:fillRect/>
+          </a:stretch>
+        </p:blipFill>
+        <p:spPr>
+          <a:xfrm>
+            <a:off x="3916195" y="1825625"/>
+            <a:ext cx="4359610" cy="4351338"/>
+          </a:xfrm>
+        </p:spPr>
+      </p:pic>
+    </p:spTree>
+    <p:extLst>
+      <p:ext uri="{BB962C8B-B14F-4D97-AF65-F5344CB8AC3E}">
+        <p14:creationId xmlns:p14="http://schemas.microsoft.com/office/powerpoint/2010/main" val="1216411407"/>
+      </p:ext>
+    </p:extLst>
+  </p:cSld>
+  <p:clrMapOvr>
+    <a:masterClrMapping/>
+  </p:clrMapOvr>
+</p:sld>
+</file>
+
+<file path=ppt/slides/slide18.xml><?xml version="1.0" encoding="utf-8"?>
+<p:sld xmlns:a="http://schemas.openxmlformats.org/drawingml/2006/main" xmlns:r="http://schemas.openxmlformats.org/officeDocument/2006/relationships" xmlns:p="http://schemas.openxmlformats.org/presentationml/2006/main">
+  <p:cSld>
+    <p:spTree>
+      <p:nvGrpSpPr>
+        <p:cNvPr id="1" name=""/>
+        <p:cNvGrpSpPr/>
+        <p:nvPr/>
+      </p:nvGrpSpPr>
+      <p:grpSpPr>
+        <a:xfrm>
+          <a:off x="0" y="0"/>
+          <a:ext cx="0" cy="0"/>
+          <a:chOff x="0" y="0"/>
+          <a:chExt cx="0" cy="0"/>
+        </a:xfrm>
+      </p:grpSpPr>
+      <p:sp>
+        <p:nvSpPr>
+          <p:cNvPr id="2" name="Title 1">
+            <a:extLst>
+              <a:ext uri="{FF2B5EF4-FFF2-40B4-BE49-F238E27FC236}">
+                <a16:creationId xmlns:a16="http://schemas.microsoft.com/office/drawing/2014/main" id="{C1CB1F6E-9CFD-0948-9545-1B29E2E6499B}"/>
+              </a:ext>
+            </a:extLst>
+          </p:cNvPr>
+          <p:cNvSpPr>
+            <a:spLocks noGrp="1"/>
+          </p:cNvSpPr>
+          <p:nvPr>
+            <p:ph type="title"/>
+          </p:nvPr>
+        </p:nvSpPr>
+        <p:spPr/>
+        <p:txBody>
+          <a:bodyPr/>
+          <a:lstStyle/>
+          <a:p>
+            <a:r>
+              <a:rPr lang="en-US" dirty="0"/>
+              <a:t>Logical concept map</a:t>
+            </a:r>
+          </a:p>
+        </p:txBody>
+      </p:sp>
+      <p:pic>
+        <p:nvPicPr>
+          <p:cNvPr id="5" name="Content Placeholder 4">
+            <a:extLst>
+              <a:ext uri="{FF2B5EF4-FFF2-40B4-BE49-F238E27FC236}">
+                <a16:creationId xmlns:a16="http://schemas.microsoft.com/office/drawing/2014/main" id="{29FB4F80-E9D4-9740-8200-5A3FB69159A2}"/>
+              </a:ext>
+            </a:extLst>
+          </p:cNvPr>
+          <p:cNvPicPr>
+            <a:picLocks noGrp="1" noChangeAspect="1"/>
+          </p:cNvPicPr>
+          <p:nvPr>
+            <p:ph idx="1"/>
+          </p:nvPr>
+        </p:nvPicPr>
+        <p:blipFill>
+          <a:blip r:embed="rId2">
+            <a:extLst>
+              <a:ext uri="{28A0092B-C50C-407E-A947-70E740481C1C}">
+                <a14:useLocalDpi xmlns:a14="http://schemas.microsoft.com/office/drawing/2010/main" val="0"/>
+              </a:ext>
+            </a:extLst>
+          </a:blip>
+          <a:stretch>
+            <a:fillRect/>
+          </a:stretch>
+        </p:blipFill>
+        <p:spPr>
+          <a:xfrm>
+            <a:off x="3854450" y="2693194"/>
+            <a:ext cx="4483100" cy="2616200"/>
+          </a:xfrm>
+        </p:spPr>
+      </p:pic>
+    </p:spTree>
+    <p:extLst>
+      <p:ext uri="{BB962C8B-B14F-4D97-AF65-F5344CB8AC3E}">
+        <p14:creationId xmlns:p14="http://schemas.microsoft.com/office/powerpoint/2010/main" val="76428056"/>
+      </p:ext>
+    </p:extLst>
+  </p:cSld>
+  <p:clrMapOvr>
+    <a:masterClrMapping/>
+  </p:clrMapOvr>
+</p:sld>
+</file>
+
+<file path=ppt/slides/slide19.xml><?xml version="1.0" encoding="utf-8"?>
+<p:sld xmlns:a="http://schemas.openxmlformats.org/drawingml/2006/main" xmlns:r="http://schemas.openxmlformats.org/officeDocument/2006/relationships" xmlns:p="http://schemas.openxmlformats.org/presentationml/2006/main">
+  <p:cSld>
+    <p:spTree>
+      <p:nvGrpSpPr>
+        <p:cNvPr id="1" name=""/>
+        <p:cNvGrpSpPr/>
+        <p:nvPr/>
+      </p:nvGrpSpPr>
+      <p:grpSpPr>
+        <a:xfrm>
+          <a:off x="0" y="0"/>
+          <a:ext cx="0" cy="0"/>
+          <a:chOff x="0" y="0"/>
+          <a:chExt cx="0" cy="0"/>
+        </a:xfrm>
+      </p:grpSpPr>
+      <p:sp>
+        <p:nvSpPr>
+          <p:cNvPr id="2" name="Title 1">
+            <a:extLst>
+              <a:ext uri="{FF2B5EF4-FFF2-40B4-BE49-F238E27FC236}">
+                <a16:creationId xmlns:a16="http://schemas.microsoft.com/office/drawing/2014/main" id="{3CA454A4-FE43-0042-B8B4-BD2635022CFF}"/>
+              </a:ext>
+            </a:extLst>
+          </p:cNvPr>
+          <p:cNvSpPr>
+            <a:spLocks noGrp="1"/>
+          </p:cNvSpPr>
+          <p:nvPr>
+            <p:ph type="title"/>
+          </p:nvPr>
+        </p:nvSpPr>
+        <p:spPr/>
+        <p:txBody>
+          <a:bodyPr/>
+          <a:lstStyle/>
+          <a:p>
+            <a:r>
+              <a:rPr lang="en-US" dirty="0"/>
+              <a:t>C-level model (see the 18-mo. version)</a:t>
+            </a:r>
+          </a:p>
+        </p:txBody>
+      </p:sp>
+      <p:pic>
+        <p:nvPicPr>
+          <p:cNvPr id="5" name="Content Placeholder 4">
+            <a:extLst>
+              <a:ext uri="{FF2B5EF4-FFF2-40B4-BE49-F238E27FC236}">
+                <a16:creationId xmlns:a16="http://schemas.microsoft.com/office/drawing/2014/main" id="{AC9BCC23-BC2F-C440-9F66-21C48725E7EC}"/>
+              </a:ext>
+            </a:extLst>
+          </p:cNvPr>
+          <p:cNvPicPr>
+            <a:picLocks noGrp="1" noChangeAspect="1"/>
+          </p:cNvPicPr>
+          <p:nvPr>
+            <p:ph idx="1"/>
+          </p:nvPr>
+        </p:nvPicPr>
+        <p:blipFill>
+          <a:blip r:embed="rId2">
+            <a:extLst>
+              <a:ext uri="{28A0092B-C50C-407E-A947-70E740481C1C}">
+                <a14:useLocalDpi xmlns:a14="http://schemas.microsoft.com/office/drawing/2010/main" val="0"/>
+              </a:ext>
+            </a:extLst>
+          </a:blip>
+          <a:stretch>
+            <a:fillRect/>
+          </a:stretch>
+        </p:blipFill>
+        <p:spPr>
+          <a:xfrm>
+            <a:off x="2940328" y="1825625"/>
+            <a:ext cx="6311343" cy="4351338"/>
+          </a:xfrm>
+        </p:spPr>
+      </p:pic>
+    </p:spTree>
+    <p:extLst>
+      <p:ext uri="{BB962C8B-B14F-4D97-AF65-F5344CB8AC3E}">
+        <p14:creationId xmlns:p14="http://schemas.microsoft.com/office/powerpoint/2010/main" val="2150556075"/>
       </p:ext>
     </p:extLst>
   </p:cSld>
@@ -4640,7 +6207,7 @@
               <a:rPr lang="en-US" dirty="0">
                 <a:hlinkClick r:id="rId2"/>
               </a:rPr>
-              <a:t>https://github.com/michaeljon/SU_CPSC_5200_19WQ</a:t>
+              <a:t>https://github.com/michaeljon/SU_CPSC_5200_20WQ</a:t>
             </a:r>
             <a:endParaRPr lang="en-US" dirty="0"/>
           </a:p>
@@ -4704,6 +6271,585 @@
     <p:extLst>
       <p:ext uri="{BB962C8B-B14F-4D97-AF65-F5344CB8AC3E}">
         <p14:creationId xmlns:p14="http://schemas.microsoft.com/office/powerpoint/2010/main" val="281628526"/>
+      </p:ext>
+    </p:extLst>
+  </p:cSld>
+  <p:clrMapOvr>
+    <a:masterClrMapping/>
+  </p:clrMapOvr>
+</p:sld>
+</file>
+
+<file path=ppt/slides/slide20.xml><?xml version="1.0" encoding="utf-8"?>
+<p:sld xmlns:a="http://schemas.openxmlformats.org/drawingml/2006/main" xmlns:r="http://schemas.openxmlformats.org/officeDocument/2006/relationships" xmlns:p="http://schemas.openxmlformats.org/presentationml/2006/main">
+  <p:cSld>
+    <p:spTree>
+      <p:nvGrpSpPr>
+        <p:cNvPr id="1" name=""/>
+        <p:cNvGrpSpPr/>
+        <p:nvPr/>
+      </p:nvGrpSpPr>
+      <p:grpSpPr>
+        <a:xfrm>
+          <a:off x="0" y="0"/>
+          <a:ext cx="0" cy="0"/>
+          <a:chOff x="0" y="0"/>
+          <a:chExt cx="0" cy="0"/>
+        </a:xfrm>
+      </p:grpSpPr>
+      <p:sp>
+        <p:nvSpPr>
+          <p:cNvPr id="2" name="Title 1">
+            <a:extLst>
+              <a:ext uri="{FF2B5EF4-FFF2-40B4-BE49-F238E27FC236}">
+                <a16:creationId xmlns:a16="http://schemas.microsoft.com/office/drawing/2014/main" id="{F81C0E6F-DC8F-A943-A70F-41A57D1F2858}"/>
+              </a:ext>
+            </a:extLst>
+          </p:cNvPr>
+          <p:cNvSpPr>
+            <a:spLocks noGrp="1"/>
+          </p:cNvSpPr>
+          <p:nvPr>
+            <p:ph type="title"/>
+          </p:nvPr>
+        </p:nvSpPr>
+        <p:spPr/>
+        <p:txBody>
+          <a:bodyPr/>
+          <a:lstStyle/>
+          <a:p>
+            <a:r>
+              <a:rPr lang="en-US" dirty="0"/>
+              <a:t>50,000’ C</a:t>
+            </a:r>
+            <a:r>
+              <a:rPr lang="en-US" baseline="30000" dirty="0"/>
+              <a:t>-1</a:t>
+            </a:r>
+            <a:r>
+              <a:rPr lang="en-US" dirty="0"/>
+              <a:t>-level microservices model</a:t>
+            </a:r>
+          </a:p>
+        </p:txBody>
+      </p:sp>
+      <p:pic>
+        <p:nvPicPr>
+          <p:cNvPr id="5" name="Content Placeholder 4">
+            <a:extLst>
+              <a:ext uri="{FF2B5EF4-FFF2-40B4-BE49-F238E27FC236}">
+                <a16:creationId xmlns:a16="http://schemas.microsoft.com/office/drawing/2014/main" id="{E42327E6-006F-4843-BCD9-18122C1AF169}"/>
+              </a:ext>
+            </a:extLst>
+          </p:cNvPr>
+          <p:cNvPicPr>
+            <a:picLocks noGrp="1" noChangeAspect="1"/>
+          </p:cNvPicPr>
+          <p:nvPr>
+            <p:ph idx="1"/>
+          </p:nvPr>
+        </p:nvPicPr>
+        <p:blipFill>
+          <a:blip r:embed="rId2">
+            <a:extLst>
+              <a:ext uri="{28A0092B-C50C-407E-A947-70E740481C1C}">
+                <a14:useLocalDpi xmlns:a14="http://schemas.microsoft.com/office/drawing/2010/main" val="0"/>
+              </a:ext>
+            </a:extLst>
+          </a:blip>
+          <a:stretch>
+            <a:fillRect/>
+          </a:stretch>
+        </p:blipFill>
+        <p:spPr>
+          <a:xfrm>
+            <a:off x="3280428" y="1825625"/>
+            <a:ext cx="5631143" cy="4351338"/>
+          </a:xfrm>
+        </p:spPr>
+      </p:pic>
+    </p:spTree>
+    <p:extLst>
+      <p:ext uri="{BB962C8B-B14F-4D97-AF65-F5344CB8AC3E}">
+        <p14:creationId xmlns:p14="http://schemas.microsoft.com/office/powerpoint/2010/main" val="3846380962"/>
+      </p:ext>
+    </p:extLst>
+  </p:cSld>
+  <p:clrMapOvr>
+    <a:masterClrMapping/>
+  </p:clrMapOvr>
+</p:sld>
+</file>
+
+<file path=ppt/slides/slide21.xml><?xml version="1.0" encoding="utf-8"?>
+<p:sld xmlns:a="http://schemas.openxmlformats.org/drawingml/2006/main" xmlns:r="http://schemas.openxmlformats.org/officeDocument/2006/relationships" xmlns:p="http://schemas.openxmlformats.org/presentationml/2006/main">
+  <p:cSld>
+    <p:spTree>
+      <p:nvGrpSpPr>
+        <p:cNvPr id="1" name=""/>
+        <p:cNvGrpSpPr/>
+        <p:nvPr/>
+      </p:nvGrpSpPr>
+      <p:grpSpPr>
+        <a:xfrm>
+          <a:off x="0" y="0"/>
+          <a:ext cx="0" cy="0"/>
+          <a:chOff x="0" y="0"/>
+          <a:chExt cx="0" cy="0"/>
+        </a:xfrm>
+      </p:grpSpPr>
+      <p:sp>
+        <p:nvSpPr>
+          <p:cNvPr id="2" name="Title 1">
+            <a:extLst>
+              <a:ext uri="{FF2B5EF4-FFF2-40B4-BE49-F238E27FC236}">
+                <a16:creationId xmlns:a16="http://schemas.microsoft.com/office/drawing/2014/main" id="{A7131C5B-CE43-7041-B6CA-E00CF6DFC311}"/>
+              </a:ext>
+            </a:extLst>
+          </p:cNvPr>
+          <p:cNvSpPr>
+            <a:spLocks noGrp="1"/>
+          </p:cNvSpPr>
+          <p:nvPr>
+            <p:ph type="title"/>
+          </p:nvPr>
+        </p:nvSpPr>
+        <p:spPr/>
+        <p:txBody>
+          <a:bodyPr/>
+          <a:lstStyle/>
+          <a:p>
+            <a:r>
+              <a:rPr lang="en-US" dirty="0" err="1"/>
+              <a:t>BillG</a:t>
+            </a:r>
+            <a:r>
+              <a:rPr lang="en-US" dirty="0"/>
+              <a:t> review for ”future” product</a:t>
+            </a:r>
+          </a:p>
+        </p:txBody>
+      </p:sp>
+      <p:pic>
+        <p:nvPicPr>
+          <p:cNvPr id="4" name="Content Placeholder 3">
+            <a:extLst>
+              <a:ext uri="{FF2B5EF4-FFF2-40B4-BE49-F238E27FC236}">
+                <a16:creationId xmlns:a16="http://schemas.microsoft.com/office/drawing/2014/main" id="{94D78AA8-A78A-4B4F-9EB4-FD43D1A1FB30}"/>
+              </a:ext>
+            </a:extLst>
+          </p:cNvPr>
+          <p:cNvPicPr>
+            <a:picLocks noGrp="1" noChangeAspect="1"/>
+          </p:cNvPicPr>
+          <p:nvPr>
+            <p:ph idx="1"/>
+          </p:nvPr>
+        </p:nvPicPr>
+        <p:blipFill>
+          <a:blip r:embed="rId2"/>
+          <a:stretch>
+            <a:fillRect/>
+          </a:stretch>
+        </p:blipFill>
+        <p:spPr>
+          <a:xfrm>
+            <a:off x="3199028" y="1825625"/>
+            <a:ext cx="5793943" cy="4351338"/>
+          </a:xfrm>
+          <a:prstGeom prst="rect">
+            <a:avLst/>
+          </a:prstGeom>
+        </p:spPr>
+      </p:pic>
+    </p:spTree>
+    <p:extLst>
+      <p:ext uri="{BB962C8B-B14F-4D97-AF65-F5344CB8AC3E}">
+        <p14:creationId xmlns:p14="http://schemas.microsoft.com/office/powerpoint/2010/main" val="3210593899"/>
+      </p:ext>
+    </p:extLst>
+  </p:cSld>
+  <p:clrMapOvr>
+    <a:masterClrMapping/>
+  </p:clrMapOvr>
+</p:sld>
+</file>
+
+<file path=ppt/slides/slide22.xml><?xml version="1.0" encoding="utf-8"?>
+<p:sld xmlns:a="http://schemas.openxmlformats.org/drawingml/2006/main" xmlns:r="http://schemas.openxmlformats.org/officeDocument/2006/relationships" xmlns:p="http://schemas.openxmlformats.org/presentationml/2006/main">
+  <p:cSld>
+    <p:spTree>
+      <p:nvGrpSpPr>
+        <p:cNvPr id="1" name=""/>
+        <p:cNvGrpSpPr/>
+        <p:nvPr/>
+      </p:nvGrpSpPr>
+      <p:grpSpPr>
+        <a:xfrm>
+          <a:off x="0" y="0"/>
+          <a:ext cx="0" cy="0"/>
+          <a:chOff x="0" y="0"/>
+          <a:chExt cx="0" cy="0"/>
+        </a:xfrm>
+      </p:grpSpPr>
+      <p:sp>
+        <p:nvSpPr>
+          <p:cNvPr id="2" name="Title 1">
+            <a:extLst>
+              <a:ext uri="{FF2B5EF4-FFF2-40B4-BE49-F238E27FC236}">
+                <a16:creationId xmlns:a16="http://schemas.microsoft.com/office/drawing/2014/main" id="{E769078A-8FFF-0B44-BF79-A550E62177D4}"/>
+              </a:ext>
+            </a:extLst>
+          </p:cNvPr>
+          <p:cNvSpPr>
+            <a:spLocks noGrp="1"/>
+          </p:cNvSpPr>
+          <p:nvPr>
+            <p:ph type="title"/>
+          </p:nvPr>
+        </p:nvSpPr>
+        <p:spPr/>
+        <p:txBody>
+          <a:bodyPr/>
+          <a:lstStyle/>
+          <a:p>
+            <a:r>
+              <a:rPr lang="en-US" dirty="0"/>
+              <a:t>Customer-facing view of previous</a:t>
+            </a:r>
+          </a:p>
+        </p:txBody>
+      </p:sp>
+      <p:pic>
+        <p:nvPicPr>
+          <p:cNvPr id="5" name="Content Placeholder 4">
+            <a:extLst>
+              <a:ext uri="{FF2B5EF4-FFF2-40B4-BE49-F238E27FC236}">
+                <a16:creationId xmlns:a16="http://schemas.microsoft.com/office/drawing/2014/main" id="{E4780A1B-073C-084C-8F69-3292D5E1D94D}"/>
+              </a:ext>
+            </a:extLst>
+          </p:cNvPr>
+          <p:cNvPicPr>
+            <a:picLocks noGrp="1" noChangeAspect="1"/>
+          </p:cNvPicPr>
+          <p:nvPr>
+            <p:ph idx="1"/>
+          </p:nvPr>
+        </p:nvPicPr>
+        <p:blipFill>
+          <a:blip r:embed="rId2"/>
+          <a:stretch>
+            <a:fillRect/>
+          </a:stretch>
+        </p:blipFill>
+        <p:spPr>
+          <a:xfrm>
+            <a:off x="3197459" y="1825625"/>
+            <a:ext cx="5797082" cy="4351338"/>
+          </a:xfrm>
+          <a:prstGeom prst="rect">
+            <a:avLst/>
+          </a:prstGeom>
+        </p:spPr>
+      </p:pic>
+    </p:spTree>
+    <p:extLst>
+      <p:ext uri="{BB962C8B-B14F-4D97-AF65-F5344CB8AC3E}">
+        <p14:creationId xmlns:p14="http://schemas.microsoft.com/office/powerpoint/2010/main" val="2589144616"/>
+      </p:ext>
+    </p:extLst>
+  </p:cSld>
+  <p:clrMapOvr>
+    <a:masterClrMapping/>
+  </p:clrMapOvr>
+</p:sld>
+</file>
+
+<file path=ppt/slides/slide23.xml><?xml version="1.0" encoding="utf-8"?>
+<p:sld xmlns:a="http://schemas.openxmlformats.org/drawingml/2006/main" xmlns:r="http://schemas.openxmlformats.org/officeDocument/2006/relationships" xmlns:p="http://schemas.openxmlformats.org/presentationml/2006/main">
+  <p:cSld>
+    <p:spTree>
+      <p:nvGrpSpPr>
+        <p:cNvPr id="1" name=""/>
+        <p:cNvGrpSpPr/>
+        <p:nvPr/>
+      </p:nvGrpSpPr>
+      <p:grpSpPr>
+        <a:xfrm>
+          <a:off x="0" y="0"/>
+          <a:ext cx="0" cy="0"/>
+          <a:chOff x="0" y="0"/>
+          <a:chExt cx="0" cy="0"/>
+        </a:xfrm>
+      </p:grpSpPr>
+      <p:sp>
+        <p:nvSpPr>
+          <p:cNvPr id="2" name="Title 1">
+            <a:extLst>
+              <a:ext uri="{FF2B5EF4-FFF2-40B4-BE49-F238E27FC236}">
+                <a16:creationId xmlns:a16="http://schemas.microsoft.com/office/drawing/2014/main" id="{206389D4-E7F9-954F-9311-3FAB881A6858}"/>
+              </a:ext>
+            </a:extLst>
+          </p:cNvPr>
+          <p:cNvSpPr>
+            <a:spLocks noGrp="1"/>
+          </p:cNvSpPr>
+          <p:nvPr>
+            <p:ph type="title"/>
+          </p:nvPr>
+        </p:nvSpPr>
+        <p:spPr/>
+        <p:txBody>
+          <a:bodyPr/>
+          <a:lstStyle/>
+          <a:p>
+            <a:r>
+              <a:rPr lang="en-US" dirty="0"/>
+              <a:t>Dev-level “standardized” web app</a:t>
+            </a:r>
+          </a:p>
+        </p:txBody>
+      </p:sp>
+      <p:pic>
+        <p:nvPicPr>
+          <p:cNvPr id="4" name="Content Placeholder 3">
+            <a:extLst>
+              <a:ext uri="{FF2B5EF4-FFF2-40B4-BE49-F238E27FC236}">
+                <a16:creationId xmlns:a16="http://schemas.microsoft.com/office/drawing/2014/main" id="{36857528-BD1A-7940-9B57-283010650AE2}"/>
+              </a:ext>
+            </a:extLst>
+          </p:cNvPr>
+          <p:cNvPicPr>
+            <a:picLocks noGrp="1" noChangeAspect="1"/>
+          </p:cNvPicPr>
+          <p:nvPr>
+            <p:ph idx="1"/>
+          </p:nvPr>
+        </p:nvPicPr>
+        <p:blipFill>
+          <a:blip r:embed="rId2"/>
+          <a:stretch>
+            <a:fillRect/>
+          </a:stretch>
+        </p:blipFill>
+        <p:spPr>
+          <a:xfrm>
+            <a:off x="3131268" y="1825625"/>
+            <a:ext cx="5929464" cy="4351338"/>
+          </a:xfrm>
+          <a:prstGeom prst="rect">
+            <a:avLst/>
+          </a:prstGeom>
+        </p:spPr>
+      </p:pic>
+    </p:spTree>
+    <p:extLst>
+      <p:ext uri="{BB962C8B-B14F-4D97-AF65-F5344CB8AC3E}">
+        <p14:creationId xmlns:p14="http://schemas.microsoft.com/office/powerpoint/2010/main" val="2165793277"/>
+      </p:ext>
+    </p:extLst>
+  </p:cSld>
+  <p:clrMapOvr>
+    <a:masterClrMapping/>
+  </p:clrMapOvr>
+</p:sld>
+</file>
+
+<file path=ppt/slides/slide24.xml><?xml version="1.0" encoding="utf-8"?>
+<p:sld xmlns:a="http://schemas.openxmlformats.org/drawingml/2006/main" xmlns:r="http://schemas.openxmlformats.org/officeDocument/2006/relationships" xmlns:p="http://schemas.openxmlformats.org/presentationml/2006/main">
+  <p:cSld>
+    <p:spTree>
+      <p:nvGrpSpPr>
+        <p:cNvPr id="1" name=""/>
+        <p:cNvGrpSpPr/>
+        <p:nvPr/>
+      </p:nvGrpSpPr>
+      <p:grpSpPr>
+        <a:xfrm>
+          <a:off x="0" y="0"/>
+          <a:ext cx="0" cy="0"/>
+          <a:chOff x="0" y="0"/>
+          <a:chExt cx="0" cy="0"/>
+        </a:xfrm>
+      </p:grpSpPr>
+      <p:sp>
+        <p:nvSpPr>
+          <p:cNvPr id="2" name="Title 1">
+            <a:extLst>
+              <a:ext uri="{FF2B5EF4-FFF2-40B4-BE49-F238E27FC236}">
+                <a16:creationId xmlns:a16="http://schemas.microsoft.com/office/drawing/2014/main" id="{9BD7E18C-40EB-D147-87E6-F5FF76B87335}"/>
+              </a:ext>
+            </a:extLst>
+          </p:cNvPr>
+          <p:cNvSpPr>
+            <a:spLocks noGrp="1"/>
+          </p:cNvSpPr>
+          <p:nvPr>
+            <p:ph type="title"/>
+          </p:nvPr>
+        </p:nvSpPr>
+        <p:spPr/>
+        <p:txBody>
+          <a:bodyPr/>
+          <a:lstStyle/>
+          <a:p>
+            <a:r>
+              <a:rPr lang="en-US" dirty="0"/>
+              <a:t>SME-facing concept model</a:t>
+            </a:r>
+          </a:p>
+        </p:txBody>
+      </p:sp>
+      <p:pic>
+        <p:nvPicPr>
+          <p:cNvPr id="4" name="Content Placeholder 3">
+            <a:extLst>
+              <a:ext uri="{FF2B5EF4-FFF2-40B4-BE49-F238E27FC236}">
+                <a16:creationId xmlns:a16="http://schemas.microsoft.com/office/drawing/2014/main" id="{DE99FB21-D698-DF44-97F5-32CA760B9514}"/>
+              </a:ext>
+            </a:extLst>
+          </p:cNvPr>
+          <p:cNvPicPr>
+            <a:picLocks noGrp="1" noChangeAspect="1"/>
+          </p:cNvPicPr>
+          <p:nvPr>
+            <p:ph idx="1"/>
+          </p:nvPr>
+        </p:nvPicPr>
+        <p:blipFill>
+          <a:blip r:embed="rId2"/>
+          <a:stretch>
+            <a:fillRect/>
+          </a:stretch>
+        </p:blipFill>
+        <p:spPr>
+          <a:xfrm>
+            <a:off x="2734841" y="1825625"/>
+            <a:ext cx="6722317" cy="4351338"/>
+          </a:xfrm>
+          <a:prstGeom prst="rect">
+            <a:avLst/>
+          </a:prstGeom>
+        </p:spPr>
+      </p:pic>
+    </p:spTree>
+    <p:extLst>
+      <p:ext uri="{BB962C8B-B14F-4D97-AF65-F5344CB8AC3E}">
+        <p14:creationId xmlns:p14="http://schemas.microsoft.com/office/powerpoint/2010/main" val="3812959360"/>
+      </p:ext>
+    </p:extLst>
+  </p:cSld>
+  <p:clrMapOvr>
+    <a:masterClrMapping/>
+  </p:clrMapOvr>
+</p:sld>
+</file>
+
+<file path=ppt/slides/slide25.xml><?xml version="1.0" encoding="utf-8"?>
+<p:sld xmlns:a="http://schemas.openxmlformats.org/drawingml/2006/main" xmlns:r="http://schemas.openxmlformats.org/officeDocument/2006/relationships" xmlns:p="http://schemas.openxmlformats.org/presentationml/2006/main">
+  <p:cSld>
+    <p:spTree>
+      <p:nvGrpSpPr>
+        <p:cNvPr id="1" name=""/>
+        <p:cNvGrpSpPr/>
+        <p:nvPr/>
+      </p:nvGrpSpPr>
+      <p:grpSpPr>
+        <a:xfrm>
+          <a:off x="0" y="0"/>
+          <a:ext cx="0" cy="0"/>
+          <a:chOff x="0" y="0"/>
+          <a:chExt cx="0" cy="0"/>
+        </a:xfrm>
+      </p:grpSpPr>
+      <p:sp>
+        <p:nvSpPr>
+          <p:cNvPr id="2" name="Title 1">
+            <a:extLst>
+              <a:ext uri="{FF2B5EF4-FFF2-40B4-BE49-F238E27FC236}">
+                <a16:creationId xmlns:a16="http://schemas.microsoft.com/office/drawing/2014/main" id="{8E88CEC7-E63A-494C-9BC2-DB90A7014CD6}"/>
+              </a:ext>
+            </a:extLst>
+          </p:cNvPr>
+          <p:cNvSpPr>
+            <a:spLocks noGrp="1"/>
+          </p:cNvSpPr>
+          <p:nvPr>
+            <p:ph type="title"/>
+          </p:nvPr>
+        </p:nvSpPr>
+        <p:spPr/>
+        <p:txBody>
+          <a:bodyPr/>
+          <a:lstStyle/>
+          <a:p>
+            <a:r>
+              <a:rPr lang="en-US" dirty="0"/>
+              <a:t>For next time</a:t>
+            </a:r>
+          </a:p>
+        </p:txBody>
+      </p:sp>
+      <p:sp>
+        <p:nvSpPr>
+          <p:cNvPr id="3" name="Content Placeholder 2">
+            <a:extLst>
+              <a:ext uri="{FF2B5EF4-FFF2-40B4-BE49-F238E27FC236}">
+                <a16:creationId xmlns:a16="http://schemas.microsoft.com/office/drawing/2014/main" id="{FB271E12-C72C-F04C-A888-26907388E52C}"/>
+              </a:ext>
+            </a:extLst>
+          </p:cNvPr>
+          <p:cNvSpPr>
+            <a:spLocks noGrp="1"/>
+          </p:cNvSpPr>
+          <p:nvPr>
+            <p:ph idx="1"/>
+          </p:nvPr>
+        </p:nvSpPr>
+        <p:spPr/>
+        <p:txBody>
+          <a:bodyPr/>
+          <a:lstStyle/>
+          <a:p>
+            <a:pPr marL="0" indent="0">
+              <a:buNone/>
+            </a:pPr>
+            <a:r>
+              <a:rPr lang="en-US" dirty="0"/>
+              <a:t>We are going to cover the REST architectural style</a:t>
+            </a:r>
+          </a:p>
+          <a:p>
+            <a:pPr marL="0" indent="0">
+              <a:buNone/>
+            </a:pPr>
+            <a:r>
+              <a:rPr lang="en-US" dirty="0"/>
+              <a:t>Please read (at least) chapter 5 of Roy Fielding’s dissertation</a:t>
+            </a:r>
+          </a:p>
+          <a:p>
+            <a:pPr marL="0" indent="0">
+              <a:buNone/>
+            </a:pPr>
+            <a:r>
+              <a:rPr lang="en-US" sz="2000" dirty="0"/>
+              <a:t>	</a:t>
+            </a:r>
+            <a:r>
+              <a:rPr lang="en-US" sz="2000" dirty="0">
+                <a:hlinkClick r:id="rId2"/>
+              </a:rPr>
+              <a:t>http://www.ics.uci.edu/~fielding/pubs/dissertation/top.htm</a:t>
+            </a:r>
+            <a:endParaRPr lang="en-US" sz="2000" dirty="0"/>
+          </a:p>
+        </p:txBody>
+      </p:sp>
+    </p:spTree>
+    <p:extLst>
+      <p:ext uri="{BB962C8B-B14F-4D97-AF65-F5344CB8AC3E}">
+        <p14:creationId xmlns:p14="http://schemas.microsoft.com/office/powerpoint/2010/main" val="2764439232"/>
       </p:ext>
     </p:extLst>
   </p:cSld>
@@ -5302,7 +7448,7 @@
             </a:pPr>
             <a:r>
               <a:rPr lang="en-US" dirty="0"/>
-              <a:t>Eight teams of four people each (two teams will be larger)</a:t>
+              <a:t>Teams of four people each (# TBD based on class size)</a:t>
             </a:r>
           </a:p>
           <a:p>
@@ -5356,6 +7502,15 @@
             <a:r>
               <a:rPr lang="en-US" dirty="0"/>
               <a:t> system</a:t>
+            </a:r>
+          </a:p>
+          <a:p>
+            <a:pPr marL="0" indent="0">
+              <a:buNone/>
+            </a:pPr>
+            <a:r>
+              <a:rPr lang="en-US" dirty="0"/>
+              <a:t>You will submit 3 architecture / design papers (per team)</a:t>
             </a:r>
           </a:p>
           <a:p>
@@ -5536,7 +7691,7 @@
             </a:pPr>
             <a:r>
               <a:rPr lang="en-US" dirty="0"/>
-              <a:t>Two “correctness” measures</a:t>
+              <a:t>But… two “correctness” measures</a:t>
             </a:r>
           </a:p>
           <a:p>
@@ -6134,7 +8289,13 @@
       </p:grpSpPr>
       <p:sp>
         <p:nvSpPr>
-          <p:cNvPr id="4" name="Title 3"/>
+          <p:cNvPr id="5" name="Title 4">
+            <a:extLst>
+              <a:ext uri="{FF2B5EF4-FFF2-40B4-BE49-F238E27FC236}">
+                <a16:creationId xmlns:a16="http://schemas.microsoft.com/office/drawing/2014/main" id="{21F03E92-7A0E-5A4F-97EA-E2518802C75F}"/>
+              </a:ext>
+            </a:extLst>
+          </p:cNvPr>
           <p:cNvSpPr>
             <a:spLocks noGrp="1"/>
           </p:cNvSpPr>
@@ -6149,14 +8310,20 @@
           <a:p>
             <a:r>
               <a:rPr lang="en-US" dirty="0"/>
-              <a:t>Introduction</a:t>
-            </a:r>
-          </a:p>
-        </p:txBody>
-      </p:sp>
-      <p:sp>
-        <p:nvSpPr>
-          <p:cNvPr id="5" name="Text Placeholder 4"/>
+              <a:t>Any questions so far?</a:t>
+            </a:r>
+          </a:p>
+        </p:txBody>
+      </p:sp>
+      <p:sp>
+        <p:nvSpPr>
+          <p:cNvPr id="6" name="Text Placeholder 5">
+            <a:extLst>
+              <a:ext uri="{FF2B5EF4-FFF2-40B4-BE49-F238E27FC236}">
+                <a16:creationId xmlns:a16="http://schemas.microsoft.com/office/drawing/2014/main" id="{2C328671-7808-C646-BBDD-48F9C576AB34}"/>
+              </a:ext>
+            </a:extLst>
+          </p:cNvPr>
           <p:cNvSpPr>
             <a:spLocks noGrp="1"/>
           </p:cNvSpPr>
@@ -6169,22 +8336,14 @@
           <a:bodyPr/>
           <a:lstStyle/>
           <a:p>
-            <a:r>
-              <a:rPr lang="en-US" dirty="0"/>
-              <a:t>We need to start somewhere, this seems like a </a:t>
-            </a:r>
-            <a:r>
-              <a:rPr lang="en-US"/>
-              <a:t>good place</a:t>
-            </a:r>
-            <a:endParaRPr lang="en-US" dirty="0"/>
+            <a:endParaRPr lang="en-US"/>
           </a:p>
         </p:txBody>
       </p:sp>
     </p:spTree>
     <p:extLst>
       <p:ext uri="{BB962C8B-B14F-4D97-AF65-F5344CB8AC3E}">
-        <p14:creationId xmlns:p14="http://schemas.microsoft.com/office/powerpoint/2010/main" val="2579962451"/>
+        <p14:creationId xmlns:p14="http://schemas.microsoft.com/office/powerpoint/2010/main" val="1943180212"/>
       </p:ext>
     </p:extLst>
   </p:cSld>
@@ -6213,13 +8372,7 @@
       </p:grpSpPr>
       <p:sp>
         <p:nvSpPr>
-          <p:cNvPr id="2" name="Title 1">
-            <a:extLst>
-              <a:ext uri="{FF2B5EF4-FFF2-40B4-BE49-F238E27FC236}">
-                <a16:creationId xmlns:a16="http://schemas.microsoft.com/office/drawing/2014/main" id="{957309F5-C9EE-1E4C-B839-B1A47EFAE97A}"/>
-              </a:ext>
-            </a:extLst>
-          </p:cNvPr>
+          <p:cNvPr id="4" name="Title 3"/>
           <p:cNvSpPr>
             <a:spLocks noGrp="1"/>
           </p:cNvSpPr>
@@ -6234,97 +8387,42 @@
           <a:p>
             <a:r>
               <a:rPr lang="en-US" dirty="0"/>
-              <a:t>What is this architecture thing?</a:t>
-            </a:r>
-          </a:p>
-        </p:txBody>
-      </p:sp>
-      <p:sp>
-        <p:nvSpPr>
-          <p:cNvPr id="3" name="Content Placeholder 2">
-            <a:extLst>
-              <a:ext uri="{FF2B5EF4-FFF2-40B4-BE49-F238E27FC236}">
-                <a16:creationId xmlns:a16="http://schemas.microsoft.com/office/drawing/2014/main" id="{B62E1A3E-F38E-904B-B8F7-D5A1398467AD}"/>
-              </a:ext>
-            </a:extLst>
-          </p:cNvPr>
-          <p:cNvSpPr>
-            <a:spLocks noGrp="1"/>
-          </p:cNvSpPr>
-          <p:nvPr>
-            <p:ph idx="1"/>
+              <a:t>Introduction</a:t>
+            </a:r>
+          </a:p>
+        </p:txBody>
+      </p:sp>
+      <p:sp>
+        <p:nvSpPr>
+          <p:cNvPr id="5" name="Text Placeholder 4"/>
+          <p:cNvSpPr>
+            <a:spLocks noGrp="1"/>
+          </p:cNvSpPr>
+          <p:nvPr>
+            <p:ph type="body" idx="1"/>
           </p:nvPr>
         </p:nvSpPr>
         <p:spPr/>
         <p:txBody>
-          <a:bodyPr>
-            <a:normAutofit/>
-          </a:bodyPr>
-          <a:lstStyle/>
-          <a:p>
-            <a:pPr marL="0" indent="0">
-              <a:buNone/>
-            </a:pPr>
-            <a:r>
-              <a:rPr lang="en-US" dirty="0"/>
-              <a:t>Run-time abstraction view</a:t>
-            </a:r>
-          </a:p>
-          <a:p>
-            <a:pPr marL="457200" lvl="1" indent="0">
-              <a:buNone/>
-            </a:pPr>
-            <a:r>
-              <a:rPr lang="en-US" dirty="0"/>
-              <a:t>A </a:t>
-            </a:r>
-            <a:r>
-              <a:rPr lang="en-US" b="1" dirty="0"/>
-              <a:t>software architecture </a:t>
-            </a:r>
-            <a:r>
-              <a:rPr lang="en-US" dirty="0"/>
-              <a:t>is an abstraction of the run-time elements of a software system during some phase of its operation. A system may be composed of many levels of abstraction and many phases of operation, each with its own software architecture.</a:t>
-            </a:r>
-          </a:p>
-          <a:p>
-            <a:pPr marL="0" indent="0">
-              <a:buNone/>
-            </a:pPr>
+          <a:bodyPr/>
+          <a:lstStyle/>
+          <a:p>
+            <a:r>
+              <a:rPr lang="en-US" dirty="0"/>
+              <a:t>We need to start somewhere, this seems like a </a:t>
+            </a:r>
+            <a:r>
+              <a:rPr lang="en-US"/>
+              <a:t>good place</a:t>
+            </a:r>
             <a:endParaRPr lang="en-US" dirty="0"/>
-          </a:p>
-          <a:p>
-            <a:pPr marL="0" indent="0">
-              <a:buNone/>
-            </a:pPr>
-            <a:r>
-              <a:rPr lang="en-US" dirty="0"/>
-              <a:t>Elemental view</a:t>
-            </a:r>
-          </a:p>
-          <a:p>
-            <a:pPr marL="457200" lvl="1" indent="0">
-              <a:buNone/>
-            </a:pPr>
-            <a:r>
-              <a:rPr lang="en-US" dirty="0"/>
-              <a:t>A </a:t>
-            </a:r>
-            <a:r>
-              <a:rPr lang="en-US" b="1" dirty="0"/>
-              <a:t>software architecture</a:t>
-            </a:r>
-            <a:r>
-              <a:rPr lang="en-US" dirty="0"/>
-              <a:t> is defined by a configuration of architectural elements - components, connectors, and data - constrained in their relationships in order to achieve a desired set of architectural properties.</a:t>
-            </a:r>
           </a:p>
         </p:txBody>
       </p:sp>
     </p:spTree>
     <p:extLst>
       <p:ext uri="{BB962C8B-B14F-4D97-AF65-F5344CB8AC3E}">
-        <p14:creationId xmlns:p14="http://schemas.microsoft.com/office/powerpoint/2010/main" val="657190373"/>
+        <p14:creationId xmlns:p14="http://schemas.microsoft.com/office/powerpoint/2010/main" val="2579962451"/>
       </p:ext>
     </p:extLst>
   </p:cSld>

</xml_diff>